<commit_message>
Lecture 4 and 5 Update
</commit_message>
<xml_diff>
--- a/Lecture/Lecture 4/Lecture 4.pptx
+++ b/Lecture/Lecture 4/Lecture 4.pptx
@@ -26,14 +26,14 @@
     <p:sldId id="339" r:id="rId14"/>
     <p:sldId id="340" r:id="rId15"/>
     <p:sldId id="341" r:id="rId16"/>
-    <p:sldId id="346" r:id="rId17"/>
-    <p:sldId id="347" r:id="rId18"/>
-    <p:sldId id="342" r:id="rId19"/>
-    <p:sldId id="343" r:id="rId20"/>
-    <p:sldId id="348" r:id="rId21"/>
-    <p:sldId id="344" r:id="rId22"/>
-    <p:sldId id="345" r:id="rId23"/>
-    <p:sldId id="349" r:id="rId24"/>
+    <p:sldId id="358" r:id="rId17"/>
+    <p:sldId id="346" r:id="rId18"/>
+    <p:sldId id="347" r:id="rId19"/>
+    <p:sldId id="342" r:id="rId20"/>
+    <p:sldId id="343" r:id="rId21"/>
+    <p:sldId id="348" r:id="rId22"/>
+    <p:sldId id="344" r:id="rId23"/>
+    <p:sldId id="345" r:id="rId24"/>
     <p:sldId id="350" r:id="rId25"/>
     <p:sldId id="351" r:id="rId26"/>
     <p:sldId id="352" r:id="rId27"/>
@@ -306,7 +306,7 @@
               <a:pPr>
                 <a:defRPr/>
               </a:pPr>
-              <a:t>9/5/2018</a:t>
+              <a:t>1/15/2019</a:t>
             </a:fld>
             <a:endParaRPr lang="en-US" dirty="0"/>
           </a:p>
@@ -518,7 +518,7 @@
               <a:pPr>
                 <a:defRPr/>
               </a:pPr>
-              <a:t>9/5/2018</a:t>
+              <a:t>1/15/2019</a:t>
             </a:fld>
             <a:endParaRPr lang="en-US" dirty="0"/>
           </a:p>
@@ -1037,7 +1037,7 @@
               <a:pPr>
                 <a:defRPr/>
               </a:pPr>
-              <a:t>9/5/2018</a:t>
+              <a:t>1/15/2019</a:t>
             </a:fld>
             <a:endParaRPr lang="en-US" dirty="0"/>
           </a:p>
@@ -1227,7 +1227,7 @@
               <a:pPr>
                 <a:defRPr/>
               </a:pPr>
-              <a:t>9/5/2018</a:t>
+              <a:t>1/15/2019</a:t>
             </a:fld>
             <a:endParaRPr lang="en-US" dirty="0"/>
           </a:p>
@@ -1427,7 +1427,7 @@
               <a:pPr>
                 <a:defRPr/>
               </a:pPr>
-              <a:t>9/5/2018</a:t>
+              <a:t>1/15/2019</a:t>
             </a:fld>
             <a:endParaRPr lang="en-US" dirty="0"/>
           </a:p>
@@ -1695,7 +1695,7 @@
               <a:pPr>
                 <a:defRPr/>
               </a:pPr>
-              <a:t>9/5/2018</a:t>
+              <a:t>1/15/2019</a:t>
             </a:fld>
             <a:endParaRPr lang="en-US" dirty="0">
               <a:solidFill>
@@ -1909,7 +1909,7 @@
               <a:pPr>
                 <a:defRPr/>
               </a:pPr>
-              <a:t>9/5/2018</a:t>
+              <a:t>1/15/2019</a:t>
             </a:fld>
             <a:endParaRPr lang="en-US" dirty="0">
               <a:solidFill>
@@ -2200,7 +2200,7 @@
               <a:pPr>
                 <a:defRPr/>
               </a:pPr>
-              <a:t>9/5/2018</a:t>
+              <a:t>1/15/2019</a:t>
             </a:fld>
             <a:endParaRPr lang="en-US" dirty="0">
               <a:solidFill>
@@ -2531,7 +2531,7 @@
               <a:pPr>
                 <a:defRPr/>
               </a:pPr>
-              <a:t>9/5/2018</a:t>
+              <a:t>1/15/2019</a:t>
             </a:fld>
             <a:endParaRPr lang="en-US" dirty="0">
               <a:solidFill>
@@ -2996,7 +2996,7 @@
               <a:pPr>
                 <a:defRPr/>
               </a:pPr>
-              <a:t>9/5/2018</a:t>
+              <a:t>1/15/2019</a:t>
             </a:fld>
             <a:endParaRPr lang="en-US" dirty="0">
               <a:solidFill>
@@ -3159,7 +3159,7 @@
               <a:pPr>
                 <a:defRPr/>
               </a:pPr>
-              <a:t>9/5/2018</a:t>
+              <a:t>1/15/2019</a:t>
             </a:fld>
             <a:endParaRPr lang="en-US" dirty="0">
               <a:solidFill>
@@ -3300,7 +3300,7 @@
               <a:pPr>
                 <a:defRPr/>
               </a:pPr>
-              <a:t>9/5/2018</a:t>
+              <a:t>1/15/2019</a:t>
             </a:fld>
             <a:endParaRPr lang="en-US" dirty="0">
               <a:solidFill>
@@ -3621,7 +3621,7 @@
               <a:pPr>
                 <a:defRPr/>
               </a:pPr>
-              <a:t>9/5/2018</a:t>
+              <a:t>1/15/2019</a:t>
             </a:fld>
             <a:endParaRPr lang="en-US" dirty="0">
               <a:solidFill>
@@ -3829,7 +3829,7 @@
               <a:pPr>
                 <a:defRPr/>
               </a:pPr>
-              <a:t>9/5/2018</a:t>
+              <a:t>1/15/2019</a:t>
             </a:fld>
             <a:endParaRPr lang="en-US" dirty="0"/>
           </a:p>
@@ -4112,7 +4112,7 @@
               <a:pPr>
                 <a:defRPr/>
               </a:pPr>
-              <a:t>9/5/2018</a:t>
+              <a:t>1/15/2019</a:t>
             </a:fld>
             <a:endParaRPr lang="en-US" dirty="0">
               <a:solidFill>
@@ -4326,7 +4326,7 @@
               <a:pPr>
                 <a:defRPr/>
               </a:pPr>
-              <a:t>9/5/2018</a:t>
+              <a:t>1/15/2019</a:t>
             </a:fld>
             <a:endParaRPr lang="en-US" dirty="0">
               <a:solidFill>
@@ -4550,7 +4550,7 @@
               <a:pPr>
                 <a:defRPr/>
               </a:pPr>
-              <a:t>9/5/2018</a:t>
+              <a:t>1/15/2019</a:t>
             </a:fld>
             <a:endParaRPr lang="en-US" dirty="0">
               <a:solidFill>
@@ -4760,7 +4760,7 @@
               <a:pPr>
                 <a:defRPr/>
               </a:pPr>
-              <a:t>9/5/2018</a:t>
+              <a:t>1/15/2019</a:t>
             </a:fld>
             <a:endParaRPr lang="en-US" dirty="0">
               <a:solidFill>
@@ -5037,7 +5037,7 @@
               <a:pPr>
                 <a:defRPr/>
               </a:pPr>
-              <a:t>9/5/2018</a:t>
+              <a:t>1/15/2019</a:t>
             </a:fld>
             <a:endParaRPr lang="en-US" dirty="0"/>
           </a:p>
@@ -5344,7 +5344,7 @@
               <a:pPr>
                 <a:defRPr/>
               </a:pPr>
-              <a:t>9/5/2018</a:t>
+              <a:t>1/15/2019</a:t>
             </a:fld>
             <a:endParaRPr lang="en-US" dirty="0"/>
           </a:p>
@@ -5785,7 +5785,7 @@
               <a:pPr>
                 <a:defRPr/>
               </a:pPr>
-              <a:t>9/5/2018</a:t>
+              <a:t>1/15/2019</a:t>
             </a:fld>
             <a:endParaRPr lang="en-US" dirty="0"/>
           </a:p>
@@ -5924,7 +5924,7 @@
               <a:pPr>
                 <a:defRPr/>
               </a:pPr>
-              <a:t>9/5/2018</a:t>
+              <a:t>1/15/2019</a:t>
             </a:fld>
             <a:endParaRPr lang="en-US" dirty="0"/>
           </a:p>
@@ -6041,7 +6041,7 @@
               <a:pPr>
                 <a:defRPr/>
               </a:pPr>
-              <a:t>9/5/2018</a:t>
+              <a:t>1/15/2019</a:t>
             </a:fld>
             <a:endParaRPr lang="en-US" dirty="0"/>
           </a:p>
@@ -6338,7 +6338,7 @@
               <a:pPr>
                 <a:defRPr/>
               </a:pPr>
-              <a:t>9/5/2018</a:t>
+              <a:t>1/15/2019</a:t>
             </a:fld>
             <a:endParaRPr lang="en-US" dirty="0"/>
           </a:p>
@@ -6615,7 +6615,7 @@
               <a:pPr>
                 <a:defRPr/>
               </a:pPr>
-              <a:t>9/5/2018</a:t>
+              <a:t>1/15/2019</a:t>
             </a:fld>
             <a:endParaRPr lang="en-US" dirty="0"/>
           </a:p>
@@ -6872,7 +6872,7 @@
               <a:pPr>
                 <a:defRPr/>
               </a:pPr>
-              <a:t>9/5/2018</a:t>
+              <a:t>1/15/2019</a:t>
             </a:fld>
             <a:endParaRPr lang="en-US" dirty="0"/>
           </a:p>
@@ -7582,7 +7582,7 @@
               <a:pPr>
                 <a:defRPr/>
               </a:pPr>
-              <a:t>9/5/2018</a:t>
+              <a:t>1/15/2019</a:t>
             </a:fld>
             <a:endParaRPr lang="en-US" dirty="0">
               <a:solidFill>
@@ -9003,8 +9003,8 @@
         </p:blipFill>
         <p:spPr>
           <a:xfrm>
-            <a:off x="3886200" y="643466"/>
-            <a:ext cx="4928787" cy="5757333"/>
+            <a:off x="3702469" y="643467"/>
+            <a:ext cx="5279671" cy="6167202"/>
           </a:xfrm>
           <a:prstGeom prst="rect">
             <a:avLst/>
@@ -9366,7 +9366,7 @@
                   <a:srgbClr val="404040"/>
                 </a:solidFill>
               </a:rPr>
-              <a:t>All Dec. and Nov. Flights</a:t>
+              <a:t>All Dec. or Nov. Flights</a:t>
             </a:r>
           </a:p>
           <a:p>
@@ -9396,8 +9396,8 @@
         </p:nvSpPr>
         <p:spPr>
           <a:xfrm>
-            <a:off x="3886200" y="4175667"/>
-            <a:ext cx="5099808" cy="369332"/>
+            <a:off x="3581400" y="4114800"/>
+            <a:ext cx="5486400" cy="400110"/>
           </a:xfrm>
           <a:prstGeom prst="rect">
             <a:avLst/>
@@ -9405,6 +9405,11 @@
           <a:solidFill>
             <a:srgbClr val="404040"/>
           </a:solidFill>
+          <a:ln>
+            <a:solidFill>
+              <a:srgbClr val="404040"/>
+            </a:solidFill>
+          </a:ln>
         </p:spPr>
         <p:style>
           <a:lnRef idx="2">
@@ -9429,7 +9434,7 @@
           <a:lstStyle/>
           <a:p>
             <a:r>
-              <a:rPr lang="en-US" sz="1800" dirty="0">
+              <a:rPr lang="en-US" sz="2000" dirty="0">
                 <a:solidFill>
                   <a:schemeClr val="bg1"/>
                 </a:solidFill>
@@ -9437,7 +9442,7 @@
               <a:t>&gt;  filter(</a:t>
             </a:r>
             <a:r>
-              <a:rPr lang="en-US" sz="1800" dirty="0" err="1">
+              <a:rPr lang="en-US" sz="2000" dirty="0" err="1">
                 <a:solidFill>
                   <a:schemeClr val="bg1"/>
                 </a:solidFill>
@@ -9445,7 +9450,7 @@
               <a:t>flights,month</a:t>
             </a:r>
             <a:r>
-              <a:rPr lang="en-US" sz="1800" dirty="0">
+              <a:rPr lang="en-US" sz="2000" dirty="0">
                 <a:solidFill>
                   <a:schemeClr val="bg1"/>
                 </a:solidFill>
@@ -9469,8 +9474,8 @@
         </p:nvSpPr>
         <p:spPr>
           <a:xfrm>
-            <a:off x="3886200" y="5164481"/>
-            <a:ext cx="5099808" cy="369332"/>
+            <a:off x="3774696" y="5164481"/>
+            <a:ext cx="5099808" cy="400110"/>
           </a:xfrm>
           <a:prstGeom prst="rect">
             <a:avLst/>
@@ -9478,6 +9483,11 @@
           <a:solidFill>
             <a:srgbClr val="404040"/>
           </a:solidFill>
+          <a:ln>
+            <a:solidFill>
+              <a:srgbClr val="404040"/>
+            </a:solidFill>
+          </a:ln>
         </p:spPr>
         <p:style>
           <a:lnRef idx="2">
@@ -9502,7 +9512,7 @@
           <a:lstStyle/>
           <a:p>
             <a:r>
-              <a:rPr lang="en-US" sz="1800" dirty="0">
+              <a:rPr lang="en-US" sz="2000" dirty="0">
                 <a:solidFill>
                   <a:schemeClr val="bg1"/>
                 </a:solidFill>
@@ -9510,7 +9520,7 @@
               <a:t>&gt;  filter(</a:t>
             </a:r>
             <a:r>
-              <a:rPr lang="en-US" sz="1800" dirty="0" err="1">
+              <a:rPr lang="en-US" sz="2000" dirty="0" err="1">
                 <a:solidFill>
                   <a:schemeClr val="bg1"/>
                 </a:solidFill>
@@ -9518,7 +9528,7 @@
               <a:t>flights,month</a:t>
             </a:r>
             <a:r>
-              <a:rPr lang="en-US" sz="1800" dirty="0">
+              <a:rPr lang="en-US" sz="2000" dirty="0">
                 <a:solidFill>
                   <a:schemeClr val="bg1"/>
                 </a:solidFill>
@@ -9542,8 +9552,8 @@
         </p:nvSpPr>
         <p:spPr>
           <a:xfrm>
-            <a:off x="3886200" y="5686213"/>
-            <a:ext cx="5099808" cy="369332"/>
+            <a:off x="3774696" y="5690534"/>
+            <a:ext cx="5099808" cy="400110"/>
           </a:xfrm>
           <a:prstGeom prst="rect">
             <a:avLst/>
@@ -9551,6 +9561,11 @@
           <a:solidFill>
             <a:srgbClr val="404040"/>
           </a:solidFill>
+          <a:ln>
+            <a:solidFill>
+              <a:srgbClr val="404040"/>
+            </a:solidFill>
+          </a:ln>
         </p:spPr>
         <p:style>
           <a:lnRef idx="2">
@@ -9575,7 +9590,7 @@
           <a:lstStyle/>
           <a:p>
             <a:r>
-              <a:rPr lang="en-US" sz="1800" dirty="0">
+              <a:rPr lang="en-US" sz="2000" dirty="0">
                 <a:solidFill>
                   <a:schemeClr val="bg1"/>
                 </a:solidFill>
@@ -9583,7 +9598,7 @@
               <a:t>&gt;  filter(</a:t>
             </a:r>
             <a:r>
-              <a:rPr lang="en-US" sz="1800" dirty="0" err="1">
+              <a:rPr lang="en-US" sz="2000" dirty="0" err="1">
                 <a:solidFill>
                   <a:schemeClr val="bg1"/>
                 </a:solidFill>
@@ -9591,7 +9606,7 @@
               <a:t>flights,month</a:t>
             </a:r>
             <a:r>
-              <a:rPr lang="en-US" sz="1800" dirty="0">
+              <a:rPr lang="en-US" sz="2000" dirty="0">
                 <a:solidFill>
                   <a:schemeClr val="bg1"/>
                 </a:solidFill>
@@ -9955,8 +9970,8 @@
         </p:nvSpPr>
         <p:spPr>
           <a:xfrm>
-            <a:off x="3848173" y="2248562"/>
-            <a:ext cx="5099808" cy="369332"/>
+            <a:off x="3552306" y="2248562"/>
+            <a:ext cx="5557535" cy="400110"/>
           </a:xfrm>
           <a:prstGeom prst="rect">
             <a:avLst/>
@@ -9964,6 +9979,9 @@
           <a:solidFill>
             <a:srgbClr val="404040"/>
           </a:solidFill>
+          <a:ln>
+            <a:noFill/>
+          </a:ln>
         </p:spPr>
         <p:style>
           <a:lnRef idx="2">
@@ -9988,7 +10006,7 @@
           <a:lstStyle/>
           <a:p>
             <a:r>
-              <a:rPr lang="en-US" sz="1800" dirty="0">
+              <a:rPr lang="en-US" sz="2000" dirty="0">
                 <a:solidFill>
                   <a:schemeClr val="bg1"/>
                 </a:solidFill>
@@ -9996,7 +10014,7 @@
               <a:t>&gt;  filter(flights, !(</a:t>
             </a:r>
             <a:r>
-              <a:rPr lang="en-US" sz="1800" dirty="0" err="1">
+              <a:rPr lang="en-US" sz="2000" dirty="0" err="1">
                 <a:solidFill>
                   <a:schemeClr val="bg1"/>
                 </a:solidFill>
@@ -10004,7 +10022,7 @@
               <a:t>arr_delay</a:t>
             </a:r>
             <a:r>
-              <a:rPr lang="en-US" sz="1800" dirty="0">
+              <a:rPr lang="en-US" sz="2000" dirty="0">
                 <a:solidFill>
                   <a:schemeClr val="bg1"/>
                 </a:solidFill>
@@ -10012,7 +10030,7 @@
               <a:t>&gt;120 | </a:t>
             </a:r>
             <a:r>
-              <a:rPr lang="en-US" sz="1800" dirty="0" err="1">
+              <a:rPr lang="en-US" sz="2000" dirty="0" err="1">
                 <a:solidFill>
                   <a:schemeClr val="bg1"/>
                 </a:solidFill>
@@ -10020,12 +10038,12 @@
               <a:t>dep_delay</a:t>
             </a:r>
             <a:r>
-              <a:rPr lang="en-US" sz="1800" dirty="0">
+              <a:rPr lang="en-US" sz="2000" dirty="0">
                 <a:solidFill>
                   <a:schemeClr val="bg1"/>
                 </a:solidFill>
               </a:rPr>
-              <a:t>&gt;120)   )</a:t>
+              <a:t>&gt;120) )</a:t>
             </a:r>
           </a:p>
         </p:txBody>
@@ -10044,8 +10062,8 @@
         </p:nvSpPr>
         <p:spPr>
           <a:xfrm>
-            <a:off x="3848173" y="2785984"/>
-            <a:ext cx="5099808" cy="369332"/>
+            <a:off x="3552306" y="2785984"/>
+            <a:ext cx="5557535" cy="400110"/>
           </a:xfrm>
           <a:prstGeom prst="rect">
             <a:avLst/>
@@ -10053,6 +10071,9 @@
           <a:solidFill>
             <a:srgbClr val="404040"/>
           </a:solidFill>
+          <a:ln>
+            <a:noFill/>
+          </a:ln>
         </p:spPr>
         <p:style>
           <a:lnRef idx="2">
@@ -10077,7 +10098,7 @@
           <a:lstStyle/>
           <a:p>
             <a:r>
-              <a:rPr lang="en-US" sz="1800" dirty="0">
+              <a:rPr lang="en-US" sz="2000" dirty="0">
                 <a:solidFill>
                   <a:schemeClr val="bg1"/>
                 </a:solidFill>
@@ -10085,7 +10106,7 @@
               <a:t>&gt;  filter(flights, </a:t>
             </a:r>
             <a:r>
-              <a:rPr lang="en-US" sz="1800" dirty="0" err="1">
+              <a:rPr lang="en-US" sz="2000" dirty="0" err="1">
                 <a:solidFill>
                   <a:schemeClr val="bg1"/>
                 </a:solidFill>
@@ -10093,7 +10114,7 @@
               <a:t>arr_delay</a:t>
             </a:r>
             <a:r>
-              <a:rPr lang="en-US" sz="1800" dirty="0">
+              <a:rPr lang="en-US" sz="2000" dirty="0">
                 <a:solidFill>
                   <a:schemeClr val="bg1"/>
                 </a:solidFill>
@@ -10101,7 +10122,7 @@
               <a:t> &lt;= 120, </a:t>
             </a:r>
             <a:r>
-              <a:rPr lang="en-US" sz="1800" dirty="0" err="1">
+              <a:rPr lang="en-US" sz="2000" dirty="0" err="1">
                 <a:solidFill>
                   <a:schemeClr val="bg1"/>
                 </a:solidFill>
@@ -10109,7 +10130,7 @@
               <a:t>dep_delay</a:t>
             </a:r>
             <a:r>
-              <a:rPr lang="en-US" sz="1800" dirty="0">
+              <a:rPr lang="en-US" sz="2000" dirty="0">
                 <a:solidFill>
                   <a:schemeClr val="bg1"/>
                 </a:solidFill>
@@ -10133,8 +10154,8 @@
         </p:nvSpPr>
         <p:spPr>
           <a:xfrm>
-            <a:off x="3848173" y="4636421"/>
-            <a:ext cx="5099808" cy="369332"/>
+            <a:off x="3552306" y="4641291"/>
+            <a:ext cx="5557535" cy="400110"/>
           </a:xfrm>
           <a:prstGeom prst="rect">
             <a:avLst/>
@@ -10142,6 +10163,9 @@
           <a:solidFill>
             <a:srgbClr val="404040"/>
           </a:solidFill>
+          <a:ln>
+            <a:noFill/>
+          </a:ln>
         </p:spPr>
         <p:style>
           <a:lnRef idx="2">
@@ -10166,7 +10190,7 @@
           <a:lstStyle/>
           <a:p>
             <a:r>
-              <a:rPr lang="en-US" sz="1800" dirty="0">
+              <a:rPr lang="en-US" sz="2000" dirty="0">
                 <a:solidFill>
                   <a:schemeClr val="bg1"/>
                 </a:solidFill>
@@ -10174,7 +10198,7 @@
               <a:t>&gt;  filter(flights, </a:t>
             </a:r>
             <a:r>
-              <a:rPr lang="en-US" sz="1800" dirty="0" err="1">
+              <a:rPr lang="en-US" sz="2000" dirty="0" err="1">
                 <a:solidFill>
                   <a:schemeClr val="bg1"/>
                 </a:solidFill>
@@ -10182,7 +10206,7 @@
               <a:t>dep_delay</a:t>
             </a:r>
             <a:r>
-              <a:rPr lang="en-US" sz="1800" dirty="0">
+              <a:rPr lang="en-US" sz="2000" dirty="0">
                 <a:solidFill>
                   <a:schemeClr val="bg1"/>
                 </a:solidFill>
@@ -10190,7 +10214,7 @@
               <a:t>==0 &amp; </a:t>
             </a:r>
             <a:r>
-              <a:rPr lang="en-US" sz="1800" dirty="0" err="1">
+              <a:rPr lang="en-US" sz="2000" dirty="0" err="1">
                 <a:solidFill>
                   <a:schemeClr val="bg1"/>
                 </a:solidFill>
@@ -10198,7 +10222,7 @@
               <a:t>arr_delay</a:t>
             </a:r>
             <a:r>
-              <a:rPr lang="en-US" sz="1800" dirty="0">
+              <a:rPr lang="en-US" sz="2000" dirty="0">
                 <a:solidFill>
                   <a:schemeClr val="bg1"/>
                 </a:solidFill>
@@ -10222,8 +10246,8 @@
         </p:nvSpPr>
         <p:spPr>
           <a:xfrm>
-            <a:off x="3848173" y="4114800"/>
-            <a:ext cx="5099808" cy="369332"/>
+            <a:off x="3552306" y="4114800"/>
+            <a:ext cx="5557535" cy="400110"/>
           </a:xfrm>
           <a:prstGeom prst="rect">
             <a:avLst/>
@@ -10231,6 +10255,9 @@
           <a:solidFill>
             <a:srgbClr val="404040"/>
           </a:solidFill>
+          <a:ln>
+            <a:noFill/>
+          </a:ln>
         </p:spPr>
         <p:style>
           <a:lnRef idx="2">
@@ -10255,7 +10282,7 @@
           <a:lstStyle/>
           <a:p>
             <a:r>
-              <a:rPr lang="en-US" sz="1800" dirty="0">
+              <a:rPr lang="en-US" sz="2000" dirty="0">
                 <a:solidFill>
                   <a:schemeClr val="bg1"/>
                 </a:solidFill>
@@ -10263,7 +10290,7 @@
               <a:t>&gt;  filter(flights, </a:t>
             </a:r>
             <a:r>
-              <a:rPr lang="en-US" sz="1800" dirty="0" err="1">
+              <a:rPr lang="en-US" sz="2000" dirty="0" err="1">
                 <a:solidFill>
                   <a:schemeClr val="bg1"/>
                 </a:solidFill>
@@ -10271,7 +10298,7 @@
               <a:t>dep_delay</a:t>
             </a:r>
             <a:r>
-              <a:rPr lang="en-US" sz="1800" dirty="0">
+              <a:rPr lang="en-US" sz="2000" dirty="0">
                 <a:solidFill>
                   <a:schemeClr val="bg1"/>
                 </a:solidFill>
@@ -10279,7 +10306,7 @@
               <a:t>==0, </a:t>
             </a:r>
             <a:r>
-              <a:rPr lang="en-US" sz="1800" dirty="0" err="1">
+              <a:rPr lang="en-US" sz="2000" dirty="0" err="1">
                 <a:solidFill>
                   <a:schemeClr val="bg1"/>
                 </a:solidFill>
@@ -10287,7 +10314,7 @@
               <a:t>arr_delay</a:t>
             </a:r>
             <a:r>
-              <a:rPr lang="en-US" sz="1800" dirty="0">
+              <a:rPr lang="en-US" sz="2000" dirty="0">
                 <a:solidFill>
                   <a:schemeClr val="bg1"/>
                 </a:solidFill>
@@ -10503,7 +10530,7 @@
         <p:spPr>
           <a:xfrm>
             <a:off x="3777352" y="643467"/>
-            <a:ext cx="5061848" cy="6001643"/>
+            <a:ext cx="5061848" cy="5262979"/>
           </a:xfrm>
           <a:prstGeom prst="rect">
             <a:avLst/>
@@ -10633,19 +10660,8 @@
                   <a:srgbClr val="404040"/>
                 </a:solidFill>
               </a:rPr>
-              <a:t>Remove All Cases with Missing Values for All Variables</a:t>
-            </a:r>
-          </a:p>
-          <a:p>
-            <a:pPr marL="800100" lvl="1" indent="-342900">
-              <a:buFont typeface="Arial" panose="020B0604020202020204" pitchFamily="34" charset="0"/>
-              <a:buChar char="•"/>
-            </a:pPr>
-            <a:endParaRPr lang="en-US" dirty="0">
-              <a:solidFill>
-                <a:srgbClr val="404040"/>
-              </a:solidFill>
-            </a:endParaRPr>
+              <a:t>Remove All Cases with Missing Values</a:t>
+            </a:r>
           </a:p>
           <a:p>
             <a:pPr lvl="1"/>
@@ -10671,8 +10687,8 @@
         </p:nvSpPr>
         <p:spPr>
           <a:xfrm>
-            <a:off x="3778737" y="2055633"/>
-            <a:ext cx="5099808" cy="369332"/>
+            <a:off x="4648200" y="1905000"/>
+            <a:ext cx="3649517" cy="400110"/>
           </a:xfrm>
           <a:prstGeom prst="rect">
             <a:avLst/>
@@ -10680,6 +10696,11 @@
           <a:solidFill>
             <a:srgbClr val="404040"/>
           </a:solidFill>
+          <a:ln>
+            <a:solidFill>
+              <a:srgbClr val="404040"/>
+            </a:solidFill>
+          </a:ln>
         </p:spPr>
         <p:style>
           <a:lnRef idx="2">
@@ -10704,7 +10725,7 @@
           <a:lstStyle/>
           <a:p>
             <a:r>
-              <a:rPr lang="en-US" sz="1800" dirty="0">
+              <a:rPr lang="en-US" sz="2000" dirty="0">
                 <a:solidFill>
                   <a:schemeClr val="bg1"/>
                 </a:solidFill>
@@ -10712,7 +10733,7 @@
               <a:t>&gt;  filter(flights, is.na(</a:t>
             </a:r>
             <a:r>
-              <a:rPr lang="en-US" sz="1800" dirty="0" err="1">
+              <a:rPr lang="en-US" sz="2000" dirty="0" err="1">
                 <a:solidFill>
                   <a:schemeClr val="bg1"/>
                 </a:solidFill>
@@ -10720,7 +10741,7 @@
               <a:t>air_time</a:t>
             </a:r>
             <a:r>
-              <a:rPr lang="en-US" sz="1800" dirty="0">
+              <a:rPr lang="en-US" sz="2000" dirty="0">
                 <a:solidFill>
                   <a:schemeClr val="bg1"/>
                 </a:solidFill>
@@ -10744,8 +10765,8 @@
         </p:nvSpPr>
         <p:spPr>
           <a:xfrm>
-            <a:off x="3778737" y="3842266"/>
-            <a:ext cx="5099808" cy="369332"/>
+            <a:off x="4648200" y="3733800"/>
+            <a:ext cx="3649517" cy="400110"/>
           </a:xfrm>
           <a:prstGeom prst="rect">
             <a:avLst/>
@@ -10753,6 +10774,11 @@
           <a:solidFill>
             <a:srgbClr val="404040"/>
           </a:solidFill>
+          <a:ln>
+            <a:solidFill>
+              <a:srgbClr val="404040"/>
+            </a:solidFill>
+          </a:ln>
         </p:spPr>
         <p:style>
           <a:lnRef idx="2">
@@ -10777,7 +10803,7 @@
           <a:lstStyle/>
           <a:p>
             <a:r>
-              <a:rPr lang="en-US" sz="1800" dirty="0">
+              <a:rPr lang="en-US" sz="2000" dirty="0">
                 <a:solidFill>
                   <a:schemeClr val="bg1"/>
                 </a:solidFill>
@@ -10785,7 +10811,7 @@
               <a:t>&gt;  filter(flights, !is.na(</a:t>
             </a:r>
             <a:r>
-              <a:rPr lang="en-US" sz="1800" dirty="0" err="1">
+              <a:rPr lang="en-US" sz="2000" dirty="0" err="1">
                 <a:solidFill>
                   <a:schemeClr val="bg1"/>
                 </a:solidFill>
@@ -10793,7 +10819,7 @@
               <a:t>air_time</a:t>
             </a:r>
             <a:r>
-              <a:rPr lang="en-US" sz="1800" dirty="0">
+              <a:rPr lang="en-US" sz="2000" dirty="0">
                 <a:solidFill>
                   <a:schemeClr val="bg1"/>
                 </a:solidFill>
@@ -10817,8 +10843,8 @@
         </p:nvSpPr>
         <p:spPr>
           <a:xfrm>
-            <a:off x="3799519" y="5891754"/>
-            <a:ext cx="5099808" cy="369332"/>
+            <a:off x="4645859" y="5562017"/>
+            <a:ext cx="3649517" cy="400110"/>
           </a:xfrm>
           <a:prstGeom prst="rect">
             <a:avLst/>
@@ -10826,6 +10852,11 @@
           <a:solidFill>
             <a:srgbClr val="404040"/>
           </a:solidFill>
+          <a:ln>
+            <a:solidFill>
+              <a:srgbClr val="404040"/>
+            </a:solidFill>
+          </a:ln>
         </p:spPr>
         <p:style>
           <a:lnRef idx="2">
@@ -10850,7 +10881,7 @@
           <a:lstStyle/>
           <a:p>
             <a:r>
-              <a:rPr lang="en-US" sz="1800" dirty="0">
+              <a:rPr lang="en-US" sz="2000" dirty="0">
                 <a:solidFill>
                   <a:schemeClr val="bg1"/>
                 </a:solidFill>
@@ -10858,7 +10889,7 @@
               <a:t>&gt;  </a:t>
             </a:r>
             <a:r>
-              <a:rPr lang="en-US" sz="1800" dirty="0" err="1">
+              <a:rPr lang="en-US" sz="2000" dirty="0" err="1">
                 <a:solidFill>
                   <a:schemeClr val="bg1"/>
                 </a:solidFill>
@@ -10866,7 +10897,7 @@
               <a:t>na.omit</a:t>
             </a:r>
             <a:r>
-              <a:rPr lang="en-US" sz="1800" dirty="0">
+              <a:rPr lang="en-US" sz="2000" dirty="0">
                 <a:solidFill>
                   <a:schemeClr val="bg1"/>
                 </a:solidFill>
@@ -11082,7 +11113,7 @@
         <p:spPr>
           <a:xfrm>
             <a:off x="3777352" y="643467"/>
-            <a:ext cx="5061848" cy="5632311"/>
+            <a:ext cx="5250186" cy="6370975"/>
           </a:xfrm>
           <a:prstGeom prst="rect">
             <a:avLst/>
@@ -11109,6 +11140,10 @@
             </a:r>
           </a:p>
           <a:p>
+            <a:pPr marL="342900" indent="-342900">
+              <a:buFont typeface="Arial" panose="020B0604020202020204" pitchFamily="34" charset="0"/>
+              <a:buChar char="•"/>
+            </a:pPr>
             <a:endParaRPr lang="en-US" dirty="0">
               <a:solidFill>
                 <a:srgbClr val="404040"/>
@@ -11120,6 +11155,20 @@
               <a:buFont typeface="Arial" panose="020B0604020202020204" pitchFamily="34" charset="0"/>
               <a:buChar char="•"/>
             </a:pPr>
+            <a:r>
+              <a:rPr lang="en-US" dirty="0">
+                <a:solidFill>
+                  <a:srgbClr val="404040"/>
+                </a:solidFill>
+              </a:rPr>
+              <a:t>Raw Flight Data</a:t>
+            </a:r>
+          </a:p>
+          <a:p>
+            <a:pPr marL="342900" indent="-342900">
+              <a:buFont typeface="Arial" panose="020B0604020202020204" pitchFamily="34" charset="0"/>
+              <a:buChar char="•"/>
+            </a:pPr>
             <a:endParaRPr lang="en-US" dirty="0">
               <a:solidFill>
                 <a:srgbClr val="404040"/>
@@ -11138,6 +11187,10 @@
             </a:endParaRPr>
           </a:p>
           <a:p>
+            <a:pPr marL="342900" indent="-342900">
+              <a:buFont typeface="Arial" panose="020B0604020202020204" pitchFamily="34" charset="0"/>
+              <a:buChar char="•"/>
+            </a:pPr>
             <a:endParaRPr lang="en-US" dirty="0">
               <a:solidFill>
                 <a:srgbClr val="404040"/>
@@ -11145,6 +11198,10 @@
             </a:endParaRPr>
           </a:p>
           <a:p>
+            <a:pPr marL="342900" indent="-342900">
+              <a:buFont typeface="Arial" panose="020B0604020202020204" pitchFamily="34" charset="0"/>
+              <a:buChar char="•"/>
+            </a:pPr>
             <a:endParaRPr lang="en-US" dirty="0">
               <a:solidFill>
                 <a:srgbClr val="404040"/>
@@ -11156,20 +11213,6 @@
               <a:buFont typeface="Arial" panose="020B0604020202020204" pitchFamily="34" charset="0"/>
               <a:buChar char="•"/>
             </a:pPr>
-            <a:r>
-              <a:rPr lang="en-US" dirty="0">
-                <a:solidFill>
-                  <a:srgbClr val="404040"/>
-                </a:solidFill>
-              </a:rPr>
-              <a:t>Sorting Experiment</a:t>
-            </a:r>
-          </a:p>
-          <a:p>
-            <a:pPr marL="800100" lvl="1" indent="-342900">
-              <a:buFont typeface="Arial" panose="020B0604020202020204" pitchFamily="34" charset="0"/>
-              <a:buChar char="•"/>
-            </a:pPr>
             <a:endParaRPr lang="en-US" dirty="0">
               <a:solidFill>
                 <a:srgbClr val="404040"/>
@@ -11186,6 +11229,31 @@
                 <a:srgbClr val="404040"/>
               </a:solidFill>
             </a:endParaRPr>
+          </a:p>
+          <a:p>
+            <a:pPr marL="342900" indent="-342900">
+              <a:buFont typeface="Arial" panose="020B0604020202020204" pitchFamily="34" charset="0"/>
+              <a:buChar char="•"/>
+            </a:pPr>
+            <a:endParaRPr lang="en-US" dirty="0">
+              <a:solidFill>
+                <a:srgbClr val="404040"/>
+              </a:solidFill>
+            </a:endParaRPr>
+          </a:p>
+          <a:p>
+            <a:pPr marL="342900" indent="-342900">
+              <a:buFont typeface="Arial" panose="020B0604020202020204" pitchFamily="34" charset="0"/>
+              <a:buChar char="•"/>
+            </a:pPr>
+            <a:r>
+              <a:rPr lang="en-US" dirty="0">
+                <a:solidFill>
+                  <a:srgbClr val="404040"/>
+                </a:solidFill>
+              </a:rPr>
+              <a:t>Sorted by Day, Month, Year (Time)</a:t>
+            </a:r>
           </a:p>
           <a:p>
             <a:pPr marL="342900" indent="-342900">
@@ -11266,8 +11334,8 @@
         </p:blipFill>
         <p:spPr>
           <a:xfrm>
-            <a:off x="3886200" y="1066800"/>
-            <a:ext cx="4184075" cy="1522086"/>
+            <a:off x="3581400" y="1905000"/>
+            <a:ext cx="5446138" cy="1981200"/>
           </a:xfrm>
           <a:prstGeom prst="rect">
             <a:avLst/>
@@ -11293,6 +11361,240 @@
           </a:fontRef>
         </p:style>
       </p:pic>
+    </p:spTree>
+    <p:custDataLst>
+      <p:tags r:id="rId1"/>
+    </p:custDataLst>
+    <p:extLst>
+      <p:ext uri="{BB962C8B-B14F-4D97-AF65-F5344CB8AC3E}">
+        <p14:creationId xmlns:p14="http://schemas.microsoft.com/office/powerpoint/2010/main" val="530858181"/>
+      </p:ext>
+    </p:extLst>
+  </p:cSld>
+  <p:clrMapOvr>
+    <a:masterClrMapping/>
+  </p:clrMapOvr>
+</p:sld>
+</file>
+
+<file path=ppt/slides/slide16.xml><?xml version="1.0" encoding="utf-8"?>
+<p:sld xmlns:a="http://schemas.openxmlformats.org/drawingml/2006/main" xmlns:r="http://schemas.openxmlformats.org/officeDocument/2006/relationships" xmlns:p="http://schemas.openxmlformats.org/presentationml/2006/main">
+  <p:cSld>
+    <p:bg>
+      <p:bgPr>
+        <a:solidFill>
+          <a:schemeClr val="bg1">
+            <a:lumMod val="85000"/>
+          </a:schemeClr>
+        </a:solidFill>
+        <a:effectLst/>
+      </p:bgPr>
+    </p:bg>
+    <p:spTree>
+      <p:nvGrpSpPr>
+        <p:cNvPr id="1" name=""/>
+        <p:cNvGrpSpPr/>
+        <p:nvPr/>
+      </p:nvGrpSpPr>
+      <p:grpSpPr>
+        <a:xfrm>
+          <a:off x="0" y="0"/>
+          <a:ext cx="0" cy="0"/>
+          <a:chOff x="0" y="0"/>
+          <a:chExt cx="0" cy="0"/>
+        </a:xfrm>
+      </p:grpSpPr>
+      <p:sp>
+        <p:nvSpPr>
+          <p:cNvPr id="15" name="Rectangle 12">
+            <a:extLst>
+              <a:ext uri="{FF2B5EF4-FFF2-40B4-BE49-F238E27FC236}">
+                <a16:creationId xmlns:a16="http://schemas.microsoft.com/office/drawing/2014/main" id="{867D4867-5BA7-4462-B2F6-A23F4A622AA7}"/>
+              </a:ext>
+              <a:ext uri="{C183D7F6-B498-43B3-948B-1728B52AA6E4}">
+                <adec:decorative xmlns:adec="http://schemas.microsoft.com/office/drawing/2017/decorative" val="1"/>
+              </a:ext>
+            </a:extLst>
+          </p:cNvPr>
+          <p:cNvSpPr>
+            <a:spLocks noGrp="1" noRot="1" noChangeAspect="1" noMove="1" noResize="1" noEditPoints="1" noAdjustHandles="1" noChangeArrowheads="1" noChangeShapeType="1" noTextEdit="1"/>
+          </p:cNvSpPr>
+          <p:nvPr>
+            <p:extLst>
+              <p:ext uri="{386F3935-93C4-4BCD-93E2-E3B085C9AB24}">
+                <p16:designElem xmlns:p16="http://schemas.microsoft.com/office/powerpoint/2015/main" val="1"/>
+              </p:ext>
+            </p:extLst>
+          </p:nvPr>
+        </p:nvSpPr>
+        <p:spPr>
+          <a:xfrm>
+            <a:off x="0" y="0"/>
+            <a:ext cx="3490722" cy="6858000"/>
+          </a:xfrm>
+          <a:prstGeom prst="rect">
+            <a:avLst/>
+          </a:prstGeom>
+          <a:solidFill>
+            <a:schemeClr val="tx1">
+              <a:lumMod val="75000"/>
+              <a:lumOff val="25000"/>
+            </a:schemeClr>
+          </a:solidFill>
+          <a:ln>
+            <a:noFill/>
+          </a:ln>
+        </p:spPr>
+        <p:style>
+          <a:lnRef idx="0">
+            <a:scrgbClr r="0" g="0" b="0"/>
+          </a:lnRef>
+          <a:fillRef idx="0">
+            <a:scrgbClr r="0" g="0" b="0"/>
+          </a:fillRef>
+          <a:effectRef idx="0">
+            <a:scrgbClr r="0" g="0" b="0"/>
+          </a:effectRef>
+          <a:fontRef idx="minor">
+            <a:schemeClr val="lt1"/>
+          </a:fontRef>
+        </p:style>
+        <p:txBody>
+          <a:bodyPr rtlCol="0" anchor="ctr"/>
+          <a:lstStyle/>
+          <a:p>
+            <a:pPr algn="ctr"/>
+            <a:endParaRPr lang="en-US"/>
+          </a:p>
+        </p:txBody>
+      </p:sp>
+      <p:sp>
+        <p:nvSpPr>
+          <p:cNvPr id="2" name="Title 1"/>
+          <p:cNvSpPr>
+            <a:spLocks noGrp="1"/>
+          </p:cNvSpPr>
+          <p:nvPr>
+            <p:ph type="title"/>
+          </p:nvPr>
+        </p:nvSpPr>
+        <p:spPr>
+          <a:xfrm>
+            <a:off x="482600" y="643467"/>
+            <a:ext cx="2522980" cy="1597315"/>
+          </a:xfrm>
+          <a:noFill/>
+          <a:ln w="19050">
+            <a:solidFill>
+              <a:schemeClr val="bg1"/>
+            </a:solidFill>
+          </a:ln>
+        </p:spPr>
+        <p:txBody>
+          <a:bodyPr vert="horz" wrap="square" lIns="91440" tIns="45720" rIns="91440" bIns="45720" rtlCol="0" anchor="ctr">
+            <a:normAutofit/>
+          </a:bodyPr>
+          <a:lstStyle/>
+          <a:p>
+            <a:pPr defTabSz="914400" eaLnBrk="1" hangingPunct="1">
+              <a:lnSpc>
+                <a:spcPct val="90000"/>
+              </a:lnSpc>
+            </a:pPr>
+            <a:r>
+              <a:rPr lang="en-US" sz="2400" dirty="0">
+                <a:solidFill>
+                  <a:schemeClr val="bg1"/>
+                </a:solidFill>
+                <a:ea typeface="+mj-ea"/>
+                <a:cs typeface="+mj-cs"/>
+              </a:rPr>
+              <a:t>arrange()</a:t>
+            </a:r>
+            <a:endParaRPr lang="en-US" sz="2400" kern="1200" dirty="0">
+              <a:solidFill>
+                <a:schemeClr val="bg1"/>
+              </a:solidFill>
+              <a:latin typeface="+mj-lt"/>
+              <a:ea typeface="+mj-ea"/>
+              <a:cs typeface="+mj-cs"/>
+            </a:endParaRPr>
+          </a:p>
+        </p:txBody>
+      </p:sp>
+      <p:pic>
+        <p:nvPicPr>
+          <p:cNvPr id="8" name="Picture 7">
+            <a:extLst>
+              <a:ext uri="{FF2B5EF4-FFF2-40B4-BE49-F238E27FC236}">
+                <a16:creationId xmlns:a16="http://schemas.microsoft.com/office/drawing/2014/main" id="{521D4292-9ECC-4DA5-8CC0-C561A0DA118E}"/>
+              </a:ext>
+            </a:extLst>
+          </p:cNvPr>
+          <p:cNvPicPr>
+            <a:picLocks noChangeAspect="1"/>
+          </p:cNvPicPr>
+          <p:nvPr/>
+        </p:nvPicPr>
+        <p:blipFill rotWithShape="1">
+          <a:blip r:embed="rId3"/>
+          <a:srcRect l="8000" r="9400"/>
+          <a:stretch/>
+        </p:blipFill>
+        <p:spPr>
+          <a:xfrm>
+            <a:off x="660103" y="3048000"/>
+            <a:ext cx="2167974" cy="2624666"/>
+          </a:xfrm>
+          <a:prstGeom prst="rect">
+            <a:avLst/>
+          </a:prstGeom>
+          <a:noFill/>
+        </p:spPr>
+      </p:pic>
+      <p:sp>
+        <p:nvSpPr>
+          <p:cNvPr id="3" name="TextBox 2">
+            <a:extLst>
+              <a:ext uri="{FF2B5EF4-FFF2-40B4-BE49-F238E27FC236}">
+                <a16:creationId xmlns:a16="http://schemas.microsoft.com/office/drawing/2014/main" id="{F11A48DB-9DC8-487D-B292-F37C24E1A4C6}"/>
+              </a:ext>
+            </a:extLst>
+          </p:cNvPr>
+          <p:cNvSpPr txBox="1"/>
+          <p:nvPr/>
+        </p:nvSpPr>
+        <p:spPr>
+          <a:xfrm>
+            <a:off x="3777352" y="643467"/>
+            <a:ext cx="5061848" cy="461665"/>
+          </a:xfrm>
+          <a:prstGeom prst="rect">
+            <a:avLst/>
+          </a:prstGeom>
+          <a:noFill/>
+        </p:spPr>
+        <p:txBody>
+          <a:bodyPr wrap="square" rtlCol="0">
+            <a:spAutoFit/>
+          </a:bodyPr>
+          <a:lstStyle/>
+          <a:p>
+            <a:pPr marL="342900" indent="-342900">
+              <a:buFont typeface="Arial" panose="020B0604020202020204" pitchFamily="34" charset="0"/>
+              <a:buChar char="•"/>
+            </a:pPr>
+            <a:r>
+              <a:rPr lang="en-US" dirty="0">
+                <a:solidFill>
+                  <a:srgbClr val="404040"/>
+                </a:solidFill>
+              </a:rPr>
+              <a:t>Sorting Experiment</a:t>
+            </a:r>
+          </a:p>
+        </p:txBody>
+      </p:sp>
       <p:pic>
         <p:nvPicPr>
           <p:cNvPr id="12" name="Picture 11">
@@ -11308,15 +11610,15 @@
           <p:nvPr/>
         </p:nvPicPr>
         <p:blipFill>
-          <a:blip r:embed="rId5"/>
+          <a:blip r:embed="rId4"/>
           <a:stretch>
             <a:fillRect/>
           </a:stretch>
         </p:blipFill>
         <p:spPr>
           <a:xfrm>
-            <a:off x="3886200" y="3276600"/>
-            <a:ext cx="4234782" cy="1522086"/>
+            <a:off x="3552207" y="1212345"/>
+            <a:ext cx="5512138" cy="1981200"/>
           </a:xfrm>
           <a:prstGeom prst="rect">
             <a:avLst/>
@@ -11357,15 +11659,15 @@
           <p:nvPr/>
         </p:nvPicPr>
         <p:blipFill>
-          <a:blip r:embed="rId6"/>
+          <a:blip r:embed="rId5"/>
           <a:stretch>
             <a:fillRect/>
           </a:stretch>
         </p:blipFill>
         <p:spPr>
           <a:xfrm>
-            <a:off x="3886200" y="4999591"/>
-            <a:ext cx="4234782" cy="1502556"/>
+            <a:off x="3552207" y="3382443"/>
+            <a:ext cx="5512138" cy="1955779"/>
           </a:xfrm>
           <a:prstGeom prst="rect">
             <a:avLst/>
@@ -11402,7 +11704,7 @@
 </p:sld>
 </file>
 
-<file path=ppt/slides/slide16.xml><?xml version="1.0" encoding="utf-8"?>
+<file path=ppt/slides/slide17.xml><?xml version="1.0" encoding="utf-8"?>
 <p:sld xmlns:a="http://schemas.openxmlformats.org/drawingml/2006/main" xmlns:r="http://schemas.openxmlformats.org/officeDocument/2006/relationships" xmlns:p="http://schemas.openxmlformats.org/presentationml/2006/main">
   <p:cSld>
     <p:bg>
@@ -11719,8 +12021,8 @@
         </p:blipFill>
         <p:spPr>
           <a:xfrm>
-            <a:off x="5105400" y="1182823"/>
-            <a:ext cx="2559175" cy="2115918"/>
+            <a:off x="5029200" y="1119821"/>
+            <a:ext cx="2635375" cy="2178920"/>
           </a:xfrm>
           <a:prstGeom prst="rect">
             <a:avLst/>
@@ -11768,8 +12070,8 @@
         </p:blipFill>
         <p:spPr>
           <a:xfrm>
-            <a:off x="3609186" y="3429000"/>
-            <a:ext cx="2494828" cy="1617169"/>
+            <a:off x="3537283" y="3382392"/>
+            <a:ext cx="2566731" cy="1663777"/>
           </a:xfrm>
           <a:prstGeom prst="rect">
             <a:avLst/>
@@ -11817,8 +12119,8 @@
         </p:blipFill>
         <p:spPr>
           <a:xfrm>
-            <a:off x="6512537" y="3429000"/>
-            <a:ext cx="2494829" cy="1630607"/>
+            <a:off x="6512537" y="3389502"/>
+            <a:ext cx="2555263" cy="1670106"/>
           </a:xfrm>
           <a:prstGeom prst="rect">
             <a:avLst/>
@@ -11966,7 +12268,7 @@
         </p:blipFill>
         <p:spPr>
           <a:xfrm>
-            <a:off x="5157604" y="5181600"/>
+            <a:off x="5157604" y="5159224"/>
             <a:ext cx="2289875" cy="1617169"/>
           </a:xfrm>
           <a:prstGeom prst="rect">
@@ -12009,7 +12311,7 @@
 </p:sld>
 </file>
 
-<file path=ppt/slides/slide17.xml><?xml version="1.0" encoding="utf-8"?>
+<file path=ppt/slides/slide18.xml><?xml version="1.0" encoding="utf-8"?>
 <p:sld xmlns:a="http://schemas.openxmlformats.org/drawingml/2006/main" xmlns:r="http://schemas.openxmlformats.org/officeDocument/2006/relationships" xmlns:p="http://schemas.openxmlformats.org/presentationml/2006/main">
   <p:cSld>
     <p:bg>
@@ -12369,8 +12671,8 @@
         </p:blipFill>
         <p:spPr>
           <a:xfrm>
-            <a:off x="3894586" y="3048000"/>
-            <a:ext cx="4827379" cy="1390650"/>
+            <a:off x="3581401" y="2969683"/>
+            <a:ext cx="5486400" cy="1580498"/>
           </a:xfrm>
           <a:prstGeom prst="rect">
             <a:avLst/>
@@ -12412,7 +12714,7 @@
 </p:sld>
 </file>
 
-<file path=ppt/slides/slide18.xml><?xml version="1.0" encoding="utf-8"?>
+<file path=ppt/slides/slide19.xml><?xml version="1.0" encoding="utf-8"?>
 <p:sld xmlns:a="http://schemas.openxmlformats.org/drawingml/2006/main" xmlns:r="http://schemas.openxmlformats.org/officeDocument/2006/relationships" xmlns:p="http://schemas.openxmlformats.org/presentationml/2006/main">
   <p:cSld>
     <p:bg>
@@ -12836,8 +13138,8 @@
         </p:blipFill>
         <p:spPr>
           <a:xfrm>
-            <a:off x="4128544" y="1828800"/>
-            <a:ext cx="4681326" cy="685800"/>
+            <a:off x="3608397" y="1845617"/>
+            <a:ext cx="5459403" cy="799786"/>
           </a:xfrm>
           <a:prstGeom prst="rect">
             <a:avLst/>
@@ -12885,8 +13187,8 @@
         </p:blipFill>
         <p:spPr>
           <a:xfrm>
-            <a:off x="4126539" y="3785182"/>
-            <a:ext cx="4636461" cy="1077295"/>
+            <a:off x="3826186" y="3733274"/>
+            <a:ext cx="5116580" cy="1188852"/>
           </a:xfrm>
           <a:prstGeom prst="rect">
             <a:avLst/>
@@ -12934,8 +13236,8 @@
         </p:blipFill>
         <p:spPr>
           <a:xfrm>
-            <a:off x="4126539" y="5486400"/>
-            <a:ext cx="3886200" cy="1188852"/>
+            <a:off x="4101313" y="5486399"/>
+            <a:ext cx="4255461" cy="1301815"/>
           </a:xfrm>
           <a:prstGeom prst="rect">
             <a:avLst/>
@@ -12977,7 +13279,7 @@
 </p:sld>
 </file>
 
-<file path=ppt/slides/slide19.xml><?xml version="1.0" encoding="utf-8"?>
+<file path=ppt/slides/slide2.xml><?xml version="1.0" encoding="utf-8"?>
 <p:sld xmlns:a="http://schemas.openxmlformats.org/drawingml/2006/main" xmlns:r="http://schemas.openxmlformats.org/officeDocument/2006/relationships" xmlns:p="http://schemas.openxmlformats.org/presentationml/2006/main">
   <p:cSld>
     <p:bg>
@@ -13102,23 +13404,16 @@
               </a:lnSpc>
             </a:pPr>
             <a:r>
-              <a:rPr lang="en-US" sz="2400" dirty="0">
+              <a:rPr lang="en-US" sz="2400" kern="1200" dirty="0">
                 <a:solidFill>
                   <a:schemeClr val="bg1"/>
                 </a:solidFill>
+                <a:latin typeface="+mj-lt"/>
                 <a:ea typeface="+mj-ea"/>
                 <a:cs typeface="+mj-cs"/>
               </a:rPr>
-              <a:t>select()</a:t>
-            </a:r>
-            <a:endParaRPr lang="en-US" sz="2400" kern="1200" dirty="0">
-              <a:solidFill>
-                <a:schemeClr val="bg1"/>
-              </a:solidFill>
-              <a:latin typeface="+mj-lt"/>
-              <a:ea typeface="+mj-ea"/>
-              <a:cs typeface="+mj-cs"/>
-            </a:endParaRPr>
+              <a:t>Introduction</a:t>
+            </a:r>
           </a:p>
         </p:txBody>
       </p:sp>
@@ -13154,6 +13449,448 @@
       </p:pic>
       <p:sp>
         <p:nvSpPr>
+          <p:cNvPr id="4" name="TextBox 3">
+            <a:extLst>
+              <a:ext uri="{FF2B5EF4-FFF2-40B4-BE49-F238E27FC236}">
+                <a16:creationId xmlns:a16="http://schemas.microsoft.com/office/drawing/2014/main" id="{9B70DD5F-80AF-47A6-9622-DF0880C2AE63}"/>
+              </a:ext>
+            </a:extLst>
+          </p:cNvPr>
+          <p:cNvSpPr txBox="1"/>
+          <p:nvPr/>
+        </p:nvSpPr>
+        <p:spPr>
+          <a:xfrm>
+            <a:off x="3810000" y="643467"/>
+            <a:ext cx="4953000" cy="4154984"/>
+          </a:xfrm>
+          <a:prstGeom prst="rect">
+            <a:avLst/>
+          </a:prstGeom>
+          <a:noFill/>
+        </p:spPr>
+        <p:txBody>
+          <a:bodyPr wrap="square" rtlCol="0">
+            <a:spAutoFit/>
+          </a:bodyPr>
+          <a:lstStyle/>
+          <a:p>
+            <a:pPr marL="342900" indent="-342900">
+              <a:buFont typeface="Arial" panose="020B0604020202020204" pitchFamily="34" charset="0"/>
+              <a:buChar char="•"/>
+            </a:pPr>
+            <a:r>
+              <a:rPr lang="en-US" dirty="0">
+                <a:solidFill>
+                  <a:srgbClr val="404040"/>
+                </a:solidFill>
+              </a:rPr>
+              <a:t>Read Chapter 3</a:t>
+            </a:r>
+          </a:p>
+          <a:p>
+            <a:pPr marL="342900" indent="-342900">
+              <a:buFont typeface="Arial" panose="020B0604020202020204" pitchFamily="34" charset="0"/>
+              <a:buChar char="•"/>
+            </a:pPr>
+            <a:endParaRPr lang="en-US" dirty="0">
+              <a:solidFill>
+                <a:srgbClr val="404040"/>
+              </a:solidFill>
+            </a:endParaRPr>
+          </a:p>
+          <a:p>
+            <a:pPr marL="342900" indent="-342900">
+              <a:buFont typeface="Arial" panose="020B0604020202020204" pitchFamily="34" charset="0"/>
+              <a:buChar char="•"/>
+            </a:pPr>
+            <a:r>
+              <a:rPr lang="en-US" dirty="0">
+                <a:solidFill>
+                  <a:srgbClr val="404040"/>
+                </a:solidFill>
+              </a:rPr>
+              <a:t>Goal: Their Data       Your Data</a:t>
+            </a:r>
+          </a:p>
+          <a:p>
+            <a:endParaRPr lang="en-US" dirty="0">
+              <a:solidFill>
+                <a:srgbClr val="404040"/>
+              </a:solidFill>
+            </a:endParaRPr>
+          </a:p>
+          <a:p>
+            <a:pPr marL="342900" indent="-342900">
+              <a:buFont typeface="Arial" panose="020B0604020202020204" pitchFamily="34" charset="0"/>
+              <a:buChar char="•"/>
+            </a:pPr>
+            <a:r>
+              <a:rPr lang="en-US" dirty="0">
+                <a:solidFill>
+                  <a:srgbClr val="404040"/>
+                </a:solidFill>
+              </a:rPr>
+              <a:t>Covers: </a:t>
+            </a:r>
+          </a:p>
+          <a:p>
+            <a:pPr marL="800100" lvl="1" indent="-342900">
+              <a:buFont typeface="Arial" panose="020B0604020202020204" pitchFamily="34" charset="0"/>
+              <a:buChar char="•"/>
+            </a:pPr>
+            <a:r>
+              <a:rPr lang="en-US" dirty="0">
+                <a:solidFill>
+                  <a:srgbClr val="404040"/>
+                </a:solidFill>
+              </a:rPr>
+              <a:t>Data </a:t>
+            </a:r>
+            <a:r>
+              <a:rPr lang="en-US" dirty="0" err="1">
+                <a:solidFill>
+                  <a:srgbClr val="404040"/>
+                </a:solidFill>
+              </a:rPr>
+              <a:t>Subsetting</a:t>
+            </a:r>
+            <a:endParaRPr lang="en-US" dirty="0">
+              <a:solidFill>
+                <a:srgbClr val="404040"/>
+              </a:solidFill>
+            </a:endParaRPr>
+          </a:p>
+          <a:p>
+            <a:pPr marL="800100" lvl="1" indent="-342900">
+              <a:buFont typeface="Arial" panose="020B0604020202020204" pitchFamily="34" charset="0"/>
+              <a:buChar char="•"/>
+            </a:pPr>
+            <a:r>
+              <a:rPr lang="en-US" dirty="0">
+                <a:solidFill>
+                  <a:srgbClr val="404040"/>
+                </a:solidFill>
+              </a:rPr>
+              <a:t>Data Ordering</a:t>
+            </a:r>
+          </a:p>
+          <a:p>
+            <a:pPr marL="800100" lvl="1" indent="-342900">
+              <a:buFont typeface="Arial" panose="020B0604020202020204" pitchFamily="34" charset="0"/>
+              <a:buChar char="•"/>
+            </a:pPr>
+            <a:r>
+              <a:rPr lang="en-US" dirty="0">
+                <a:solidFill>
+                  <a:srgbClr val="404040"/>
+                </a:solidFill>
+              </a:rPr>
+              <a:t>Variable Selecting</a:t>
+            </a:r>
+          </a:p>
+          <a:p>
+            <a:pPr marL="800100" lvl="1" indent="-342900">
+              <a:buFont typeface="Arial" panose="020B0604020202020204" pitchFamily="34" charset="0"/>
+              <a:buChar char="•"/>
+            </a:pPr>
+            <a:r>
+              <a:rPr lang="en-US" dirty="0">
+                <a:solidFill>
+                  <a:srgbClr val="404040"/>
+                </a:solidFill>
+              </a:rPr>
+              <a:t>Variable Creating</a:t>
+            </a:r>
+          </a:p>
+          <a:p>
+            <a:pPr marL="800100" lvl="1" indent="-342900">
+              <a:buFont typeface="Arial" panose="020B0604020202020204" pitchFamily="34" charset="0"/>
+              <a:buChar char="•"/>
+            </a:pPr>
+            <a:endParaRPr lang="en-US" dirty="0">
+              <a:solidFill>
+                <a:srgbClr val="404040"/>
+              </a:solidFill>
+            </a:endParaRPr>
+          </a:p>
+          <a:p>
+            <a:pPr marL="342900" indent="-342900">
+              <a:buFont typeface="Arial" panose="020B0604020202020204" pitchFamily="34" charset="0"/>
+              <a:buChar char="•"/>
+            </a:pPr>
+            <a:r>
+              <a:rPr lang="en-US" dirty="0">
+                <a:solidFill>
+                  <a:srgbClr val="404040"/>
+                </a:solidFill>
+              </a:rPr>
+              <a:t>Help: </a:t>
+            </a:r>
+            <a:r>
+              <a:rPr lang="en-US" dirty="0" err="1">
+                <a:solidFill>
+                  <a:srgbClr val="404040"/>
+                </a:solidFill>
+              </a:rPr>
+              <a:t>dplyr</a:t>
+            </a:r>
+            <a:r>
+              <a:rPr lang="en-US" dirty="0">
+                <a:solidFill>
+                  <a:srgbClr val="404040"/>
+                </a:solidFill>
+              </a:rPr>
+              <a:t> Package in R</a:t>
+            </a:r>
+          </a:p>
+        </p:txBody>
+      </p:sp>
+      <p:sp>
+        <p:nvSpPr>
+          <p:cNvPr id="3" name="Arrow: Right 2">
+            <a:extLst>
+              <a:ext uri="{FF2B5EF4-FFF2-40B4-BE49-F238E27FC236}">
+                <a16:creationId xmlns:a16="http://schemas.microsoft.com/office/drawing/2014/main" id="{434DE9A2-3851-4C77-9643-13134D7A0E2D}"/>
+              </a:ext>
+            </a:extLst>
+          </p:cNvPr>
+          <p:cNvSpPr/>
+          <p:nvPr/>
+        </p:nvSpPr>
+        <p:spPr>
+          <a:xfrm>
+            <a:off x="6549189" y="1493921"/>
+            <a:ext cx="457200" cy="228600"/>
+          </a:xfrm>
+          <a:prstGeom prst="rightArrow">
+            <a:avLst/>
+          </a:prstGeom>
+          <a:solidFill>
+            <a:srgbClr val="404040"/>
+          </a:solidFill>
+          <a:ln>
+            <a:solidFill>
+              <a:srgbClr val="404040"/>
+            </a:solidFill>
+          </a:ln>
+        </p:spPr>
+        <p:style>
+          <a:lnRef idx="2">
+            <a:schemeClr val="dk1"/>
+          </a:lnRef>
+          <a:fillRef idx="1">
+            <a:schemeClr val="lt1"/>
+          </a:fillRef>
+          <a:effectRef idx="0">
+            <a:schemeClr val="dk1"/>
+          </a:effectRef>
+          <a:fontRef idx="minor">
+            <a:schemeClr val="dk1"/>
+          </a:fontRef>
+        </p:style>
+        <p:txBody>
+          <a:bodyPr rtlCol="0" anchor="ctr"/>
+          <a:lstStyle/>
+          <a:p>
+            <a:pPr algn="ctr"/>
+            <a:endParaRPr lang="en-US"/>
+          </a:p>
+        </p:txBody>
+      </p:sp>
+    </p:spTree>
+    <p:custDataLst>
+      <p:tags r:id="rId1"/>
+    </p:custDataLst>
+    <p:extLst>
+      <p:ext uri="{BB962C8B-B14F-4D97-AF65-F5344CB8AC3E}">
+        <p14:creationId xmlns:p14="http://schemas.microsoft.com/office/powerpoint/2010/main" val="641320167"/>
+      </p:ext>
+    </p:extLst>
+  </p:cSld>
+  <p:clrMapOvr>
+    <a:masterClrMapping/>
+  </p:clrMapOvr>
+</p:sld>
+</file>
+
+<file path=ppt/slides/slide20.xml><?xml version="1.0" encoding="utf-8"?>
+<p:sld xmlns:a="http://schemas.openxmlformats.org/drawingml/2006/main" xmlns:r="http://schemas.openxmlformats.org/officeDocument/2006/relationships" xmlns:p="http://schemas.openxmlformats.org/presentationml/2006/main">
+  <p:cSld>
+    <p:bg>
+      <p:bgPr>
+        <a:solidFill>
+          <a:schemeClr val="bg1">
+            <a:lumMod val="85000"/>
+          </a:schemeClr>
+        </a:solidFill>
+        <a:effectLst/>
+      </p:bgPr>
+    </p:bg>
+    <p:spTree>
+      <p:nvGrpSpPr>
+        <p:cNvPr id="1" name=""/>
+        <p:cNvGrpSpPr/>
+        <p:nvPr/>
+      </p:nvGrpSpPr>
+      <p:grpSpPr>
+        <a:xfrm>
+          <a:off x="0" y="0"/>
+          <a:ext cx="0" cy="0"/>
+          <a:chOff x="0" y="0"/>
+          <a:chExt cx="0" cy="0"/>
+        </a:xfrm>
+      </p:grpSpPr>
+      <p:sp>
+        <p:nvSpPr>
+          <p:cNvPr id="15" name="Rectangle 12">
+            <a:extLst>
+              <a:ext uri="{FF2B5EF4-FFF2-40B4-BE49-F238E27FC236}">
+                <a16:creationId xmlns:a16="http://schemas.microsoft.com/office/drawing/2014/main" id="{867D4867-5BA7-4462-B2F6-A23F4A622AA7}"/>
+              </a:ext>
+              <a:ext uri="{C183D7F6-B498-43B3-948B-1728B52AA6E4}">
+                <adec:decorative xmlns:adec="http://schemas.microsoft.com/office/drawing/2017/decorative" val="1"/>
+              </a:ext>
+            </a:extLst>
+          </p:cNvPr>
+          <p:cNvSpPr>
+            <a:spLocks noGrp="1" noRot="1" noChangeAspect="1" noMove="1" noResize="1" noEditPoints="1" noAdjustHandles="1" noChangeArrowheads="1" noChangeShapeType="1" noTextEdit="1"/>
+          </p:cNvSpPr>
+          <p:nvPr>
+            <p:extLst>
+              <p:ext uri="{386F3935-93C4-4BCD-93E2-E3B085C9AB24}">
+                <p16:designElem xmlns:p16="http://schemas.microsoft.com/office/powerpoint/2015/main" val="1"/>
+              </p:ext>
+            </p:extLst>
+          </p:nvPr>
+        </p:nvSpPr>
+        <p:spPr>
+          <a:xfrm>
+            <a:off x="0" y="0"/>
+            <a:ext cx="3490722" cy="6858000"/>
+          </a:xfrm>
+          <a:prstGeom prst="rect">
+            <a:avLst/>
+          </a:prstGeom>
+          <a:solidFill>
+            <a:schemeClr val="tx1">
+              <a:lumMod val="75000"/>
+              <a:lumOff val="25000"/>
+            </a:schemeClr>
+          </a:solidFill>
+          <a:ln>
+            <a:noFill/>
+          </a:ln>
+        </p:spPr>
+        <p:style>
+          <a:lnRef idx="0">
+            <a:scrgbClr r="0" g="0" b="0"/>
+          </a:lnRef>
+          <a:fillRef idx="0">
+            <a:scrgbClr r="0" g="0" b="0"/>
+          </a:fillRef>
+          <a:effectRef idx="0">
+            <a:scrgbClr r="0" g="0" b="0"/>
+          </a:effectRef>
+          <a:fontRef idx="minor">
+            <a:schemeClr val="lt1"/>
+          </a:fontRef>
+        </p:style>
+        <p:txBody>
+          <a:bodyPr rtlCol="0" anchor="ctr"/>
+          <a:lstStyle/>
+          <a:p>
+            <a:pPr algn="ctr"/>
+            <a:endParaRPr lang="en-US"/>
+          </a:p>
+        </p:txBody>
+      </p:sp>
+      <p:sp>
+        <p:nvSpPr>
+          <p:cNvPr id="2" name="Title 1"/>
+          <p:cNvSpPr>
+            <a:spLocks noGrp="1"/>
+          </p:cNvSpPr>
+          <p:nvPr>
+            <p:ph type="title"/>
+          </p:nvPr>
+        </p:nvSpPr>
+        <p:spPr>
+          <a:xfrm>
+            <a:off x="482600" y="643467"/>
+            <a:ext cx="2522980" cy="1597315"/>
+          </a:xfrm>
+          <a:noFill/>
+          <a:ln w="19050">
+            <a:solidFill>
+              <a:schemeClr val="bg1"/>
+            </a:solidFill>
+          </a:ln>
+        </p:spPr>
+        <p:txBody>
+          <a:bodyPr vert="horz" wrap="square" lIns="91440" tIns="45720" rIns="91440" bIns="45720" rtlCol="0" anchor="ctr">
+            <a:normAutofit/>
+          </a:bodyPr>
+          <a:lstStyle/>
+          <a:p>
+            <a:pPr defTabSz="914400" eaLnBrk="1" hangingPunct="1">
+              <a:lnSpc>
+                <a:spcPct val="90000"/>
+              </a:lnSpc>
+            </a:pPr>
+            <a:r>
+              <a:rPr lang="en-US" sz="2400" dirty="0">
+                <a:solidFill>
+                  <a:schemeClr val="bg1"/>
+                </a:solidFill>
+                <a:ea typeface="+mj-ea"/>
+                <a:cs typeface="+mj-cs"/>
+              </a:rPr>
+              <a:t>select()</a:t>
+            </a:r>
+            <a:endParaRPr lang="en-US" sz="2400" kern="1200" dirty="0">
+              <a:solidFill>
+                <a:schemeClr val="bg1"/>
+              </a:solidFill>
+              <a:latin typeface="+mj-lt"/>
+              <a:ea typeface="+mj-ea"/>
+              <a:cs typeface="+mj-cs"/>
+            </a:endParaRPr>
+          </a:p>
+        </p:txBody>
+      </p:sp>
+      <p:pic>
+        <p:nvPicPr>
+          <p:cNvPr id="8" name="Picture 7">
+            <a:extLst>
+              <a:ext uri="{FF2B5EF4-FFF2-40B4-BE49-F238E27FC236}">
+                <a16:creationId xmlns:a16="http://schemas.microsoft.com/office/drawing/2014/main" id="{521D4292-9ECC-4DA5-8CC0-C561A0DA118E}"/>
+              </a:ext>
+            </a:extLst>
+          </p:cNvPr>
+          <p:cNvPicPr>
+            <a:picLocks noChangeAspect="1"/>
+          </p:cNvPicPr>
+          <p:nvPr/>
+        </p:nvPicPr>
+        <p:blipFill rotWithShape="1">
+          <a:blip r:embed="rId3"/>
+          <a:srcRect l="8000" r="9400"/>
+          <a:stretch/>
+        </p:blipFill>
+        <p:spPr>
+          <a:xfrm>
+            <a:off x="660103" y="3048000"/>
+            <a:ext cx="2167974" cy="2624666"/>
+          </a:xfrm>
+          <a:prstGeom prst="rect">
+            <a:avLst/>
+          </a:prstGeom>
+          <a:noFill/>
+        </p:spPr>
+      </p:pic>
+      <p:sp>
+        <p:nvSpPr>
           <p:cNvPr id="3" name="TextBox 2">
             <a:extLst>
               <a:ext uri="{FF2B5EF4-FFF2-40B4-BE49-F238E27FC236}">
@@ -13286,8 +14023,8 @@
         </p:blipFill>
         <p:spPr>
           <a:xfrm>
-            <a:off x="4254256" y="1121174"/>
-            <a:ext cx="4168949" cy="1393426"/>
+            <a:off x="3844040" y="1121174"/>
+            <a:ext cx="5080871" cy="1698226"/>
           </a:xfrm>
           <a:prstGeom prst="rect">
             <a:avLst/>
@@ -13335,8 +14072,8 @@
         </p:blipFill>
         <p:spPr>
           <a:xfrm>
-            <a:off x="4256303" y="3321123"/>
-            <a:ext cx="4166902" cy="3260558"/>
+            <a:off x="4170269" y="3321123"/>
+            <a:ext cx="4430497" cy="3466818"/>
           </a:xfrm>
           <a:prstGeom prst="rect">
             <a:avLst/>
@@ -13378,7 +14115,7 @@
 </p:sld>
 </file>
 
-<file path=ppt/slides/slide2.xml><?xml version="1.0" encoding="utf-8"?>
+<file path=ppt/slides/slide21.xml><?xml version="1.0" encoding="utf-8"?>
 <p:sld xmlns:a="http://schemas.openxmlformats.org/drawingml/2006/main" xmlns:r="http://schemas.openxmlformats.org/officeDocument/2006/relationships" xmlns:p="http://schemas.openxmlformats.org/presentationml/2006/main">
   <p:cSld>
     <p:bg>
@@ -13503,16 +14240,23 @@
               </a:lnSpc>
             </a:pPr>
             <a:r>
-              <a:rPr lang="en-US" sz="2400" kern="1200" dirty="0">
+              <a:rPr lang="en-US" sz="2400" dirty="0">
                 <a:solidFill>
                   <a:schemeClr val="bg1"/>
                 </a:solidFill>
-                <a:latin typeface="+mj-lt"/>
                 <a:ea typeface="+mj-ea"/>
                 <a:cs typeface="+mj-cs"/>
               </a:rPr>
-              <a:t>Data Transformation I Info</a:t>
-            </a:r>
+              <a:t>select()</a:t>
+            </a:r>
+            <a:endParaRPr lang="en-US" sz="2400" kern="1200" dirty="0">
+              <a:solidFill>
+                <a:schemeClr val="bg1"/>
+              </a:solidFill>
+              <a:latin typeface="+mj-lt"/>
+              <a:ea typeface="+mj-ea"/>
+              <a:cs typeface="+mj-cs"/>
+            </a:endParaRPr>
           </a:p>
         </p:txBody>
       </p:sp>
@@ -13548,448 +14292,6 @@
       </p:pic>
       <p:sp>
         <p:nvSpPr>
-          <p:cNvPr id="4" name="TextBox 3">
-            <a:extLst>
-              <a:ext uri="{FF2B5EF4-FFF2-40B4-BE49-F238E27FC236}">
-                <a16:creationId xmlns:a16="http://schemas.microsoft.com/office/drawing/2014/main" id="{9B70DD5F-80AF-47A6-9622-DF0880C2AE63}"/>
-              </a:ext>
-            </a:extLst>
-          </p:cNvPr>
-          <p:cNvSpPr txBox="1"/>
-          <p:nvPr/>
-        </p:nvSpPr>
-        <p:spPr>
-          <a:xfrm>
-            <a:off x="3810000" y="643467"/>
-            <a:ext cx="4953000" cy="4154984"/>
-          </a:xfrm>
-          <a:prstGeom prst="rect">
-            <a:avLst/>
-          </a:prstGeom>
-          <a:noFill/>
-        </p:spPr>
-        <p:txBody>
-          <a:bodyPr wrap="square" rtlCol="0">
-            <a:spAutoFit/>
-          </a:bodyPr>
-          <a:lstStyle/>
-          <a:p>
-            <a:pPr marL="342900" indent="-342900">
-              <a:buFont typeface="Arial" panose="020B0604020202020204" pitchFamily="34" charset="0"/>
-              <a:buChar char="•"/>
-            </a:pPr>
-            <a:r>
-              <a:rPr lang="en-US" dirty="0">
-                <a:solidFill>
-                  <a:srgbClr val="404040"/>
-                </a:solidFill>
-              </a:rPr>
-              <a:t>Read Chapter 3</a:t>
-            </a:r>
-          </a:p>
-          <a:p>
-            <a:pPr marL="342900" indent="-342900">
-              <a:buFont typeface="Arial" panose="020B0604020202020204" pitchFamily="34" charset="0"/>
-              <a:buChar char="•"/>
-            </a:pPr>
-            <a:endParaRPr lang="en-US" dirty="0">
-              <a:solidFill>
-                <a:srgbClr val="404040"/>
-              </a:solidFill>
-            </a:endParaRPr>
-          </a:p>
-          <a:p>
-            <a:pPr marL="342900" indent="-342900">
-              <a:buFont typeface="Arial" panose="020B0604020202020204" pitchFamily="34" charset="0"/>
-              <a:buChar char="•"/>
-            </a:pPr>
-            <a:r>
-              <a:rPr lang="en-US" dirty="0">
-                <a:solidFill>
-                  <a:srgbClr val="404040"/>
-                </a:solidFill>
-              </a:rPr>
-              <a:t>Goal: Their Data       Your Data</a:t>
-            </a:r>
-          </a:p>
-          <a:p>
-            <a:endParaRPr lang="en-US" dirty="0">
-              <a:solidFill>
-                <a:srgbClr val="404040"/>
-              </a:solidFill>
-            </a:endParaRPr>
-          </a:p>
-          <a:p>
-            <a:pPr marL="342900" indent="-342900">
-              <a:buFont typeface="Arial" panose="020B0604020202020204" pitchFamily="34" charset="0"/>
-              <a:buChar char="•"/>
-            </a:pPr>
-            <a:r>
-              <a:rPr lang="en-US" dirty="0">
-                <a:solidFill>
-                  <a:srgbClr val="404040"/>
-                </a:solidFill>
-              </a:rPr>
-              <a:t>Covers: </a:t>
-            </a:r>
-          </a:p>
-          <a:p>
-            <a:pPr marL="800100" lvl="1" indent="-342900">
-              <a:buFont typeface="Arial" panose="020B0604020202020204" pitchFamily="34" charset="0"/>
-              <a:buChar char="•"/>
-            </a:pPr>
-            <a:r>
-              <a:rPr lang="en-US" dirty="0">
-                <a:solidFill>
-                  <a:srgbClr val="404040"/>
-                </a:solidFill>
-              </a:rPr>
-              <a:t>Data </a:t>
-            </a:r>
-            <a:r>
-              <a:rPr lang="en-US" dirty="0" err="1">
-                <a:solidFill>
-                  <a:srgbClr val="404040"/>
-                </a:solidFill>
-              </a:rPr>
-              <a:t>Subsetting</a:t>
-            </a:r>
-            <a:endParaRPr lang="en-US" dirty="0">
-              <a:solidFill>
-                <a:srgbClr val="404040"/>
-              </a:solidFill>
-            </a:endParaRPr>
-          </a:p>
-          <a:p>
-            <a:pPr marL="800100" lvl="1" indent="-342900">
-              <a:buFont typeface="Arial" panose="020B0604020202020204" pitchFamily="34" charset="0"/>
-              <a:buChar char="•"/>
-            </a:pPr>
-            <a:r>
-              <a:rPr lang="en-US" dirty="0">
-                <a:solidFill>
-                  <a:srgbClr val="404040"/>
-                </a:solidFill>
-              </a:rPr>
-              <a:t>Data Ordering</a:t>
-            </a:r>
-          </a:p>
-          <a:p>
-            <a:pPr marL="800100" lvl="1" indent="-342900">
-              <a:buFont typeface="Arial" panose="020B0604020202020204" pitchFamily="34" charset="0"/>
-              <a:buChar char="•"/>
-            </a:pPr>
-            <a:r>
-              <a:rPr lang="en-US" dirty="0">
-                <a:solidFill>
-                  <a:srgbClr val="404040"/>
-                </a:solidFill>
-              </a:rPr>
-              <a:t>Variable Selecting</a:t>
-            </a:r>
-          </a:p>
-          <a:p>
-            <a:pPr marL="800100" lvl="1" indent="-342900">
-              <a:buFont typeface="Arial" panose="020B0604020202020204" pitchFamily="34" charset="0"/>
-              <a:buChar char="•"/>
-            </a:pPr>
-            <a:r>
-              <a:rPr lang="en-US" dirty="0">
-                <a:solidFill>
-                  <a:srgbClr val="404040"/>
-                </a:solidFill>
-              </a:rPr>
-              <a:t>Variable Creating</a:t>
-            </a:r>
-          </a:p>
-          <a:p>
-            <a:pPr marL="800100" lvl="1" indent="-342900">
-              <a:buFont typeface="Arial" panose="020B0604020202020204" pitchFamily="34" charset="0"/>
-              <a:buChar char="•"/>
-            </a:pPr>
-            <a:endParaRPr lang="en-US" dirty="0">
-              <a:solidFill>
-                <a:srgbClr val="404040"/>
-              </a:solidFill>
-            </a:endParaRPr>
-          </a:p>
-          <a:p>
-            <a:pPr marL="342900" indent="-342900">
-              <a:buFont typeface="Arial" panose="020B0604020202020204" pitchFamily="34" charset="0"/>
-              <a:buChar char="•"/>
-            </a:pPr>
-            <a:r>
-              <a:rPr lang="en-US" dirty="0">
-                <a:solidFill>
-                  <a:srgbClr val="404040"/>
-                </a:solidFill>
-              </a:rPr>
-              <a:t>Help: </a:t>
-            </a:r>
-            <a:r>
-              <a:rPr lang="en-US" dirty="0" err="1">
-                <a:solidFill>
-                  <a:srgbClr val="404040"/>
-                </a:solidFill>
-              </a:rPr>
-              <a:t>dplyr</a:t>
-            </a:r>
-            <a:r>
-              <a:rPr lang="en-US" dirty="0">
-                <a:solidFill>
-                  <a:srgbClr val="404040"/>
-                </a:solidFill>
-              </a:rPr>
-              <a:t> Package in R</a:t>
-            </a:r>
-          </a:p>
-        </p:txBody>
-      </p:sp>
-      <p:sp>
-        <p:nvSpPr>
-          <p:cNvPr id="3" name="Arrow: Right 2">
-            <a:extLst>
-              <a:ext uri="{FF2B5EF4-FFF2-40B4-BE49-F238E27FC236}">
-                <a16:creationId xmlns:a16="http://schemas.microsoft.com/office/drawing/2014/main" id="{434DE9A2-3851-4C77-9643-13134D7A0E2D}"/>
-              </a:ext>
-            </a:extLst>
-          </p:cNvPr>
-          <p:cNvSpPr/>
-          <p:nvPr/>
-        </p:nvSpPr>
-        <p:spPr>
-          <a:xfrm>
-            <a:off x="6549189" y="1493921"/>
-            <a:ext cx="457200" cy="228600"/>
-          </a:xfrm>
-          <a:prstGeom prst="rightArrow">
-            <a:avLst/>
-          </a:prstGeom>
-          <a:solidFill>
-            <a:srgbClr val="404040"/>
-          </a:solidFill>
-          <a:ln>
-            <a:solidFill>
-              <a:srgbClr val="404040"/>
-            </a:solidFill>
-          </a:ln>
-        </p:spPr>
-        <p:style>
-          <a:lnRef idx="2">
-            <a:schemeClr val="dk1"/>
-          </a:lnRef>
-          <a:fillRef idx="1">
-            <a:schemeClr val="lt1"/>
-          </a:fillRef>
-          <a:effectRef idx="0">
-            <a:schemeClr val="dk1"/>
-          </a:effectRef>
-          <a:fontRef idx="minor">
-            <a:schemeClr val="dk1"/>
-          </a:fontRef>
-        </p:style>
-        <p:txBody>
-          <a:bodyPr rtlCol="0" anchor="ctr"/>
-          <a:lstStyle/>
-          <a:p>
-            <a:pPr algn="ctr"/>
-            <a:endParaRPr lang="en-US"/>
-          </a:p>
-        </p:txBody>
-      </p:sp>
-    </p:spTree>
-    <p:custDataLst>
-      <p:tags r:id="rId1"/>
-    </p:custDataLst>
-    <p:extLst>
-      <p:ext uri="{BB962C8B-B14F-4D97-AF65-F5344CB8AC3E}">
-        <p14:creationId xmlns:p14="http://schemas.microsoft.com/office/powerpoint/2010/main" val="641320167"/>
-      </p:ext>
-    </p:extLst>
-  </p:cSld>
-  <p:clrMapOvr>
-    <a:masterClrMapping/>
-  </p:clrMapOvr>
-</p:sld>
-</file>
-
-<file path=ppt/slides/slide20.xml><?xml version="1.0" encoding="utf-8"?>
-<p:sld xmlns:a="http://schemas.openxmlformats.org/drawingml/2006/main" xmlns:r="http://schemas.openxmlformats.org/officeDocument/2006/relationships" xmlns:p="http://schemas.openxmlformats.org/presentationml/2006/main">
-  <p:cSld>
-    <p:bg>
-      <p:bgPr>
-        <a:solidFill>
-          <a:schemeClr val="bg1">
-            <a:lumMod val="85000"/>
-          </a:schemeClr>
-        </a:solidFill>
-        <a:effectLst/>
-      </p:bgPr>
-    </p:bg>
-    <p:spTree>
-      <p:nvGrpSpPr>
-        <p:cNvPr id="1" name=""/>
-        <p:cNvGrpSpPr/>
-        <p:nvPr/>
-      </p:nvGrpSpPr>
-      <p:grpSpPr>
-        <a:xfrm>
-          <a:off x="0" y="0"/>
-          <a:ext cx="0" cy="0"/>
-          <a:chOff x="0" y="0"/>
-          <a:chExt cx="0" cy="0"/>
-        </a:xfrm>
-      </p:grpSpPr>
-      <p:sp>
-        <p:nvSpPr>
-          <p:cNvPr id="15" name="Rectangle 12">
-            <a:extLst>
-              <a:ext uri="{FF2B5EF4-FFF2-40B4-BE49-F238E27FC236}">
-                <a16:creationId xmlns:a16="http://schemas.microsoft.com/office/drawing/2014/main" id="{867D4867-5BA7-4462-B2F6-A23F4A622AA7}"/>
-              </a:ext>
-              <a:ext uri="{C183D7F6-B498-43B3-948B-1728B52AA6E4}">
-                <adec:decorative xmlns:adec="http://schemas.microsoft.com/office/drawing/2017/decorative" val="1"/>
-              </a:ext>
-            </a:extLst>
-          </p:cNvPr>
-          <p:cNvSpPr>
-            <a:spLocks noGrp="1" noRot="1" noChangeAspect="1" noMove="1" noResize="1" noEditPoints="1" noAdjustHandles="1" noChangeArrowheads="1" noChangeShapeType="1" noTextEdit="1"/>
-          </p:cNvSpPr>
-          <p:nvPr>
-            <p:extLst>
-              <p:ext uri="{386F3935-93C4-4BCD-93E2-E3B085C9AB24}">
-                <p16:designElem xmlns:p16="http://schemas.microsoft.com/office/powerpoint/2015/main" val="1"/>
-              </p:ext>
-            </p:extLst>
-          </p:nvPr>
-        </p:nvSpPr>
-        <p:spPr>
-          <a:xfrm>
-            <a:off x="0" y="0"/>
-            <a:ext cx="3490722" cy="6858000"/>
-          </a:xfrm>
-          <a:prstGeom prst="rect">
-            <a:avLst/>
-          </a:prstGeom>
-          <a:solidFill>
-            <a:schemeClr val="tx1">
-              <a:lumMod val="75000"/>
-              <a:lumOff val="25000"/>
-            </a:schemeClr>
-          </a:solidFill>
-          <a:ln>
-            <a:noFill/>
-          </a:ln>
-        </p:spPr>
-        <p:style>
-          <a:lnRef idx="0">
-            <a:scrgbClr r="0" g="0" b="0"/>
-          </a:lnRef>
-          <a:fillRef idx="0">
-            <a:scrgbClr r="0" g="0" b="0"/>
-          </a:fillRef>
-          <a:effectRef idx="0">
-            <a:scrgbClr r="0" g="0" b="0"/>
-          </a:effectRef>
-          <a:fontRef idx="minor">
-            <a:schemeClr val="lt1"/>
-          </a:fontRef>
-        </p:style>
-        <p:txBody>
-          <a:bodyPr rtlCol="0" anchor="ctr"/>
-          <a:lstStyle/>
-          <a:p>
-            <a:pPr algn="ctr"/>
-            <a:endParaRPr lang="en-US"/>
-          </a:p>
-        </p:txBody>
-      </p:sp>
-      <p:sp>
-        <p:nvSpPr>
-          <p:cNvPr id="2" name="Title 1"/>
-          <p:cNvSpPr>
-            <a:spLocks noGrp="1"/>
-          </p:cNvSpPr>
-          <p:nvPr>
-            <p:ph type="title"/>
-          </p:nvPr>
-        </p:nvSpPr>
-        <p:spPr>
-          <a:xfrm>
-            <a:off x="482600" y="643467"/>
-            <a:ext cx="2522980" cy="1597315"/>
-          </a:xfrm>
-          <a:noFill/>
-          <a:ln w="19050">
-            <a:solidFill>
-              <a:schemeClr val="bg1"/>
-            </a:solidFill>
-          </a:ln>
-        </p:spPr>
-        <p:txBody>
-          <a:bodyPr vert="horz" wrap="square" lIns="91440" tIns="45720" rIns="91440" bIns="45720" rtlCol="0" anchor="ctr">
-            <a:normAutofit/>
-          </a:bodyPr>
-          <a:lstStyle/>
-          <a:p>
-            <a:pPr defTabSz="914400" eaLnBrk="1" hangingPunct="1">
-              <a:lnSpc>
-                <a:spcPct val="90000"/>
-              </a:lnSpc>
-            </a:pPr>
-            <a:r>
-              <a:rPr lang="en-US" sz="2400" dirty="0">
-                <a:solidFill>
-                  <a:schemeClr val="bg1"/>
-                </a:solidFill>
-                <a:ea typeface="+mj-ea"/>
-                <a:cs typeface="+mj-cs"/>
-              </a:rPr>
-              <a:t>select()</a:t>
-            </a:r>
-            <a:endParaRPr lang="en-US" sz="2400" kern="1200" dirty="0">
-              <a:solidFill>
-                <a:schemeClr val="bg1"/>
-              </a:solidFill>
-              <a:latin typeface="+mj-lt"/>
-              <a:ea typeface="+mj-ea"/>
-              <a:cs typeface="+mj-cs"/>
-            </a:endParaRPr>
-          </a:p>
-        </p:txBody>
-      </p:sp>
-      <p:pic>
-        <p:nvPicPr>
-          <p:cNvPr id="8" name="Picture 7">
-            <a:extLst>
-              <a:ext uri="{FF2B5EF4-FFF2-40B4-BE49-F238E27FC236}">
-                <a16:creationId xmlns:a16="http://schemas.microsoft.com/office/drawing/2014/main" id="{521D4292-9ECC-4DA5-8CC0-C561A0DA118E}"/>
-              </a:ext>
-            </a:extLst>
-          </p:cNvPr>
-          <p:cNvPicPr>
-            <a:picLocks noChangeAspect="1"/>
-          </p:cNvPicPr>
-          <p:nvPr/>
-        </p:nvPicPr>
-        <p:blipFill rotWithShape="1">
-          <a:blip r:embed="rId3"/>
-          <a:srcRect l="8000" r="9400"/>
-          <a:stretch/>
-        </p:blipFill>
-        <p:spPr>
-          <a:xfrm>
-            <a:off x="660103" y="3048000"/>
-            <a:ext cx="2167974" cy="2624666"/>
-          </a:xfrm>
-          <a:prstGeom prst="rect">
-            <a:avLst/>
-          </a:prstGeom>
-          <a:noFill/>
-        </p:spPr>
-      </p:pic>
-      <p:sp>
-        <p:nvSpPr>
           <p:cNvPr id="3" name="TextBox 2">
             <a:extLst>
               <a:ext uri="{FF2B5EF4-FFF2-40B4-BE49-F238E27FC236}">
@@ -14227,8 +14529,8 @@
         </p:blipFill>
         <p:spPr>
           <a:xfrm>
-            <a:off x="3677434" y="1905000"/>
-            <a:ext cx="5310155" cy="630130"/>
+            <a:off x="3589283" y="1905000"/>
+            <a:ext cx="5486400" cy="651044"/>
           </a:xfrm>
           <a:prstGeom prst="rect">
             <a:avLst/>
@@ -14276,8 +14578,8 @@
         </p:blipFill>
         <p:spPr>
           <a:xfrm>
-            <a:off x="3681445" y="3402932"/>
-            <a:ext cx="5310155" cy="622028"/>
+            <a:off x="3584028" y="3402931"/>
+            <a:ext cx="5486401" cy="642673"/>
           </a:xfrm>
           <a:prstGeom prst="rect">
             <a:avLst/>
@@ -14325,8 +14627,8 @@
         </p:blipFill>
         <p:spPr>
           <a:xfrm>
-            <a:off x="3681445" y="4785391"/>
-            <a:ext cx="5306144" cy="982619"/>
+            <a:off x="3581400" y="4785391"/>
+            <a:ext cx="5486400" cy="1016000"/>
           </a:xfrm>
           <a:prstGeom prst="rect">
             <a:avLst/>
@@ -14368,7 +14670,7 @@
 </p:sld>
 </file>
 
-<file path=ppt/slides/slide21.xml><?xml version="1.0" encoding="utf-8"?>
+<file path=ppt/slides/slide22.xml><?xml version="1.0" encoding="utf-8"?>
 <p:sld xmlns:a="http://schemas.openxmlformats.org/drawingml/2006/main" xmlns:r="http://schemas.openxmlformats.org/officeDocument/2006/relationships" xmlns:p="http://schemas.openxmlformats.org/presentationml/2006/main">
   <p:cSld>
     <p:bg>
@@ -14678,8 +14980,8 @@
         </p:blipFill>
         <p:spPr>
           <a:xfrm>
-            <a:off x="4038945" y="1897326"/>
-            <a:ext cx="4691062" cy="539269"/>
+            <a:off x="3568000" y="1897325"/>
+            <a:ext cx="5457699" cy="627399"/>
           </a:xfrm>
           <a:prstGeom prst="rect">
             <a:avLst/>
@@ -14727,8 +15029,8 @@
         </p:blipFill>
         <p:spPr>
           <a:xfrm>
-            <a:off x="4038945" y="3352800"/>
-            <a:ext cx="4691062" cy="2095883"/>
+            <a:off x="3568004" y="3352800"/>
+            <a:ext cx="5457693" cy="2438400"/>
           </a:xfrm>
           <a:prstGeom prst="rect">
             <a:avLst/>
@@ -14761,408 +15063,6 @@
     <p:extLst>
       <p:ext uri="{BB962C8B-B14F-4D97-AF65-F5344CB8AC3E}">
         <p14:creationId xmlns:p14="http://schemas.microsoft.com/office/powerpoint/2010/main" val="797879491"/>
-      </p:ext>
-    </p:extLst>
-  </p:cSld>
-  <p:clrMapOvr>
-    <a:masterClrMapping/>
-  </p:clrMapOvr>
-</p:sld>
-</file>
-
-<file path=ppt/slides/slide22.xml><?xml version="1.0" encoding="utf-8"?>
-<p:sld xmlns:a="http://schemas.openxmlformats.org/drawingml/2006/main" xmlns:r="http://schemas.openxmlformats.org/officeDocument/2006/relationships" xmlns:p="http://schemas.openxmlformats.org/presentationml/2006/main">
-  <p:cSld>
-    <p:bg>
-      <p:bgPr>
-        <a:solidFill>
-          <a:schemeClr val="bg1">
-            <a:lumMod val="85000"/>
-          </a:schemeClr>
-        </a:solidFill>
-        <a:effectLst/>
-      </p:bgPr>
-    </p:bg>
-    <p:spTree>
-      <p:nvGrpSpPr>
-        <p:cNvPr id="1" name=""/>
-        <p:cNvGrpSpPr/>
-        <p:nvPr/>
-      </p:nvGrpSpPr>
-      <p:grpSpPr>
-        <a:xfrm>
-          <a:off x="0" y="0"/>
-          <a:ext cx="0" cy="0"/>
-          <a:chOff x="0" y="0"/>
-          <a:chExt cx="0" cy="0"/>
-        </a:xfrm>
-      </p:grpSpPr>
-      <p:sp>
-        <p:nvSpPr>
-          <p:cNvPr id="15" name="Rectangle 12">
-            <a:extLst>
-              <a:ext uri="{FF2B5EF4-FFF2-40B4-BE49-F238E27FC236}">
-                <a16:creationId xmlns:a16="http://schemas.microsoft.com/office/drawing/2014/main" id="{867D4867-5BA7-4462-B2F6-A23F4A622AA7}"/>
-              </a:ext>
-              <a:ext uri="{C183D7F6-B498-43B3-948B-1728B52AA6E4}">
-                <adec:decorative xmlns:adec="http://schemas.microsoft.com/office/drawing/2017/decorative" val="1"/>
-              </a:ext>
-            </a:extLst>
-          </p:cNvPr>
-          <p:cNvSpPr>
-            <a:spLocks noGrp="1" noRot="1" noChangeAspect="1" noMove="1" noResize="1" noEditPoints="1" noAdjustHandles="1" noChangeArrowheads="1" noChangeShapeType="1" noTextEdit="1"/>
-          </p:cNvSpPr>
-          <p:nvPr>
-            <p:extLst>
-              <p:ext uri="{386F3935-93C4-4BCD-93E2-E3B085C9AB24}">
-                <p16:designElem xmlns:p16="http://schemas.microsoft.com/office/powerpoint/2015/main" val="1"/>
-              </p:ext>
-            </p:extLst>
-          </p:nvPr>
-        </p:nvSpPr>
-        <p:spPr>
-          <a:xfrm>
-            <a:off x="0" y="0"/>
-            <a:ext cx="3490722" cy="6858000"/>
-          </a:xfrm>
-          <a:prstGeom prst="rect">
-            <a:avLst/>
-          </a:prstGeom>
-          <a:solidFill>
-            <a:schemeClr val="tx1">
-              <a:lumMod val="75000"/>
-              <a:lumOff val="25000"/>
-            </a:schemeClr>
-          </a:solidFill>
-          <a:ln>
-            <a:noFill/>
-          </a:ln>
-        </p:spPr>
-        <p:style>
-          <a:lnRef idx="0">
-            <a:scrgbClr r="0" g="0" b="0"/>
-          </a:lnRef>
-          <a:fillRef idx="0">
-            <a:scrgbClr r="0" g="0" b="0"/>
-          </a:fillRef>
-          <a:effectRef idx="0">
-            <a:scrgbClr r="0" g="0" b="0"/>
-          </a:effectRef>
-          <a:fontRef idx="minor">
-            <a:schemeClr val="lt1"/>
-          </a:fontRef>
-        </p:style>
-        <p:txBody>
-          <a:bodyPr rtlCol="0" anchor="ctr"/>
-          <a:lstStyle/>
-          <a:p>
-            <a:pPr algn="ctr"/>
-            <a:endParaRPr lang="en-US"/>
-          </a:p>
-        </p:txBody>
-      </p:sp>
-      <p:sp>
-        <p:nvSpPr>
-          <p:cNvPr id="2" name="Title 1"/>
-          <p:cNvSpPr>
-            <a:spLocks noGrp="1"/>
-          </p:cNvSpPr>
-          <p:nvPr>
-            <p:ph type="title"/>
-          </p:nvPr>
-        </p:nvSpPr>
-        <p:spPr>
-          <a:xfrm>
-            <a:off x="482600" y="643467"/>
-            <a:ext cx="2522980" cy="1597315"/>
-          </a:xfrm>
-          <a:noFill/>
-          <a:ln w="19050">
-            <a:solidFill>
-              <a:schemeClr val="bg1"/>
-            </a:solidFill>
-          </a:ln>
-        </p:spPr>
-        <p:txBody>
-          <a:bodyPr vert="horz" wrap="square" lIns="91440" tIns="45720" rIns="91440" bIns="45720" rtlCol="0" anchor="ctr">
-            <a:normAutofit/>
-          </a:bodyPr>
-          <a:lstStyle/>
-          <a:p>
-            <a:pPr defTabSz="914400" eaLnBrk="1" hangingPunct="1">
-              <a:lnSpc>
-                <a:spcPct val="90000"/>
-              </a:lnSpc>
-            </a:pPr>
-            <a:r>
-              <a:rPr lang="en-US" sz="2400" dirty="0">
-                <a:solidFill>
-                  <a:schemeClr val="bg1"/>
-                </a:solidFill>
-                <a:ea typeface="+mj-ea"/>
-                <a:cs typeface="+mj-cs"/>
-              </a:rPr>
-              <a:t>select()</a:t>
-            </a:r>
-            <a:endParaRPr lang="en-US" sz="2400" kern="1200" dirty="0">
-              <a:solidFill>
-                <a:schemeClr val="bg1"/>
-              </a:solidFill>
-              <a:latin typeface="+mj-lt"/>
-              <a:ea typeface="+mj-ea"/>
-              <a:cs typeface="+mj-cs"/>
-            </a:endParaRPr>
-          </a:p>
-        </p:txBody>
-      </p:sp>
-      <p:pic>
-        <p:nvPicPr>
-          <p:cNvPr id="8" name="Picture 7">
-            <a:extLst>
-              <a:ext uri="{FF2B5EF4-FFF2-40B4-BE49-F238E27FC236}">
-                <a16:creationId xmlns:a16="http://schemas.microsoft.com/office/drawing/2014/main" id="{521D4292-9ECC-4DA5-8CC0-C561A0DA118E}"/>
-              </a:ext>
-            </a:extLst>
-          </p:cNvPr>
-          <p:cNvPicPr>
-            <a:picLocks noChangeAspect="1"/>
-          </p:cNvPicPr>
-          <p:nvPr/>
-        </p:nvPicPr>
-        <p:blipFill rotWithShape="1">
-          <a:blip r:embed="rId3"/>
-          <a:srcRect l="8000" r="9400"/>
-          <a:stretch/>
-        </p:blipFill>
-        <p:spPr>
-          <a:xfrm>
-            <a:off x="660103" y="3048000"/>
-            <a:ext cx="2167974" cy="2624666"/>
-          </a:xfrm>
-          <a:prstGeom prst="rect">
-            <a:avLst/>
-          </a:prstGeom>
-          <a:noFill/>
-        </p:spPr>
-      </p:pic>
-      <p:sp>
-        <p:nvSpPr>
-          <p:cNvPr id="3" name="TextBox 2">
-            <a:extLst>
-              <a:ext uri="{FF2B5EF4-FFF2-40B4-BE49-F238E27FC236}">
-                <a16:creationId xmlns:a16="http://schemas.microsoft.com/office/drawing/2014/main" id="{F11A48DB-9DC8-487D-B292-F37C24E1A4C6}"/>
-              </a:ext>
-            </a:extLst>
-          </p:cNvPr>
-          <p:cNvSpPr txBox="1"/>
-          <p:nvPr/>
-        </p:nvSpPr>
-        <p:spPr>
-          <a:xfrm>
-            <a:off x="3777352" y="643467"/>
-            <a:ext cx="5214248" cy="3046988"/>
-          </a:xfrm>
-          <a:prstGeom prst="rect">
-            <a:avLst/>
-          </a:prstGeom>
-          <a:noFill/>
-        </p:spPr>
-        <p:txBody>
-          <a:bodyPr wrap="square" rtlCol="0">
-            <a:spAutoFit/>
-          </a:bodyPr>
-          <a:lstStyle/>
-          <a:p>
-            <a:pPr marL="342900" indent="-342900">
-              <a:buFont typeface="Arial" panose="020B0604020202020204" pitchFamily="34" charset="0"/>
-              <a:buChar char="•"/>
-            </a:pPr>
-            <a:r>
-              <a:rPr lang="en-US" dirty="0">
-                <a:solidFill>
-                  <a:srgbClr val="404040"/>
-                </a:solidFill>
-              </a:rPr>
-              <a:t>Renaming Variables</a:t>
-            </a:r>
-          </a:p>
-          <a:p>
-            <a:pPr marL="800100" lvl="1" indent="-342900">
-              <a:buFont typeface="Arial" panose="020B0604020202020204" pitchFamily="34" charset="0"/>
-              <a:buChar char="•"/>
-            </a:pPr>
-            <a:endParaRPr lang="en-US" dirty="0">
-              <a:solidFill>
-                <a:srgbClr val="404040"/>
-              </a:solidFill>
-            </a:endParaRPr>
-          </a:p>
-          <a:p>
-            <a:pPr marL="800100" lvl="1" indent="-342900">
-              <a:buFont typeface="Arial" panose="020B0604020202020204" pitchFamily="34" charset="0"/>
-              <a:buChar char="•"/>
-            </a:pPr>
-            <a:r>
-              <a:rPr lang="en-US" dirty="0">
-                <a:solidFill>
-                  <a:srgbClr val="404040"/>
-                </a:solidFill>
-              </a:rPr>
-              <a:t>Can Use select()</a:t>
-            </a:r>
-          </a:p>
-          <a:p>
-            <a:pPr lvl="1"/>
-            <a:endParaRPr lang="en-US" dirty="0">
-              <a:solidFill>
-                <a:srgbClr val="404040"/>
-              </a:solidFill>
-            </a:endParaRPr>
-          </a:p>
-          <a:p>
-            <a:pPr lvl="1"/>
-            <a:endParaRPr lang="en-US" dirty="0">
-              <a:solidFill>
-                <a:srgbClr val="404040"/>
-              </a:solidFill>
-            </a:endParaRPr>
-          </a:p>
-          <a:p>
-            <a:pPr lvl="1"/>
-            <a:endParaRPr lang="en-US" dirty="0">
-              <a:solidFill>
-                <a:srgbClr val="404040"/>
-              </a:solidFill>
-            </a:endParaRPr>
-          </a:p>
-          <a:p>
-            <a:pPr marL="800100" lvl="1" indent="-342900">
-              <a:buFont typeface="Arial" panose="020B0604020202020204" pitchFamily="34" charset="0"/>
-              <a:buChar char="•"/>
-            </a:pPr>
-            <a:r>
-              <a:rPr lang="en-US" dirty="0">
-                <a:solidFill>
-                  <a:srgbClr val="404040"/>
-                </a:solidFill>
-              </a:rPr>
-              <a:t>But Use rename()</a:t>
-            </a:r>
-          </a:p>
-          <a:p>
-            <a:endParaRPr lang="en-US" dirty="0">
-              <a:solidFill>
-                <a:srgbClr val="404040"/>
-              </a:solidFill>
-            </a:endParaRPr>
-          </a:p>
-        </p:txBody>
-      </p:sp>
-      <p:pic>
-        <p:nvPicPr>
-          <p:cNvPr id="11" name="Picture 10">
-            <a:extLst>
-              <a:ext uri="{FF2B5EF4-FFF2-40B4-BE49-F238E27FC236}">
-                <a16:creationId xmlns:a16="http://schemas.microsoft.com/office/drawing/2014/main" id="{E64B3868-D237-4603-96EA-3ED588AC22FE}"/>
-              </a:ext>
-            </a:extLst>
-          </p:cNvPr>
-          <p:cNvPicPr>
-            <a:picLocks noChangeAspect="1"/>
-          </p:cNvPicPr>
-          <p:nvPr/>
-        </p:nvPicPr>
-        <p:blipFill>
-          <a:blip r:embed="rId4"/>
-          <a:stretch>
-            <a:fillRect/>
-          </a:stretch>
-        </p:blipFill>
-        <p:spPr>
-          <a:xfrm>
-            <a:off x="4038945" y="1897326"/>
-            <a:ext cx="4691062" cy="539269"/>
-          </a:xfrm>
-          <a:prstGeom prst="rect">
-            <a:avLst/>
-          </a:prstGeom>
-          <a:ln>
-            <a:solidFill>
-              <a:srgbClr val="404040"/>
-            </a:solidFill>
-          </a:ln>
-        </p:spPr>
-        <p:style>
-          <a:lnRef idx="2">
-            <a:schemeClr val="dk1"/>
-          </a:lnRef>
-          <a:fillRef idx="1">
-            <a:schemeClr val="lt1"/>
-          </a:fillRef>
-          <a:effectRef idx="0">
-            <a:schemeClr val="dk1"/>
-          </a:effectRef>
-          <a:fontRef idx="minor">
-            <a:schemeClr val="dk1"/>
-          </a:fontRef>
-        </p:style>
-      </p:pic>
-      <p:pic>
-        <p:nvPicPr>
-          <p:cNvPr id="12" name="Picture 11">
-            <a:extLst>
-              <a:ext uri="{FF2B5EF4-FFF2-40B4-BE49-F238E27FC236}">
-                <a16:creationId xmlns:a16="http://schemas.microsoft.com/office/drawing/2014/main" id="{BC90B7D1-93F3-4D1B-9AE5-E858B1E34643}"/>
-              </a:ext>
-            </a:extLst>
-          </p:cNvPr>
-          <p:cNvPicPr>
-            <a:picLocks noChangeAspect="1"/>
-          </p:cNvPicPr>
-          <p:nvPr/>
-        </p:nvPicPr>
-        <p:blipFill>
-          <a:blip r:embed="rId5"/>
-          <a:stretch>
-            <a:fillRect/>
-          </a:stretch>
-        </p:blipFill>
-        <p:spPr>
-          <a:xfrm>
-            <a:off x="4038945" y="3352800"/>
-            <a:ext cx="4691062" cy="2095883"/>
-          </a:xfrm>
-          <a:prstGeom prst="rect">
-            <a:avLst/>
-          </a:prstGeom>
-          <a:ln>
-            <a:solidFill>
-              <a:srgbClr val="404040"/>
-            </a:solidFill>
-          </a:ln>
-        </p:spPr>
-        <p:style>
-          <a:lnRef idx="2">
-            <a:schemeClr val="dk1"/>
-          </a:lnRef>
-          <a:fillRef idx="1">
-            <a:schemeClr val="lt1"/>
-          </a:fillRef>
-          <a:effectRef idx="0">
-            <a:schemeClr val="dk1"/>
-          </a:effectRef>
-          <a:fontRef idx="minor">
-            <a:schemeClr val="dk1"/>
-          </a:fontRef>
-        </p:style>
-      </p:pic>
-    </p:spTree>
-    <p:custDataLst>
-      <p:tags r:id="rId1"/>
-    </p:custDataLst>
-    <p:extLst>
-      <p:ext uri="{BB962C8B-B14F-4D97-AF65-F5344CB8AC3E}">
-        <p14:creationId xmlns:p14="http://schemas.microsoft.com/office/powerpoint/2010/main" val="2209338702"/>
       </p:ext>
     </p:extLst>
   </p:cSld>
@@ -16298,8 +16198,8 @@
         </p:blipFill>
         <p:spPr>
           <a:xfrm>
-            <a:off x="3666380" y="4033547"/>
-            <a:ext cx="5325220" cy="2154918"/>
+            <a:off x="3581400" y="4020937"/>
+            <a:ext cx="5504492" cy="2227463"/>
           </a:xfrm>
           <a:prstGeom prst="rect">
             <a:avLst/>
@@ -16347,8 +16247,8 @@
         </p:blipFill>
         <p:spPr>
           <a:xfrm>
-            <a:off x="3666380" y="1066800"/>
-            <a:ext cx="5325220" cy="2167551"/>
+            <a:off x="3581400" y="1126735"/>
+            <a:ext cx="5504492" cy="2240521"/>
           </a:xfrm>
           <a:prstGeom prst="rect">
             <a:avLst/>
@@ -16565,8 +16465,8 @@
           <a:noFill/>
         </p:spPr>
       </p:pic>
-      <mc:AlternateContent xmlns:mc="http://schemas.openxmlformats.org/markup-compatibility/2006" xmlns:a14="http://schemas.microsoft.com/office/drawing/2010/main">
-        <mc:Choice Requires="a14">
+      <mc:AlternateContent xmlns:mc="http://schemas.openxmlformats.org/markup-compatibility/2006">
+        <mc:Choice xmlns:a14="http://schemas.microsoft.com/office/drawing/2010/main" Requires="a14">
           <p:sp>
             <p:nvSpPr>
               <p:cNvPr id="3" name="TextBox 2">
@@ -16795,7 +16695,7 @@
             </p:txBody>
           </p:sp>
         </mc:Choice>
-        <mc:Fallback xmlns="">
+        <mc:Fallback>
           <p:sp>
             <p:nvSpPr>
               <p:cNvPr id="3" name="TextBox 2">
@@ -16862,8 +16762,8 @@
         </p:blipFill>
         <p:spPr>
           <a:xfrm>
-            <a:off x="4719975" y="1442124"/>
-            <a:ext cx="3433426" cy="1971767"/>
+            <a:off x="4724400" y="1453469"/>
+            <a:ext cx="3429001" cy="1969225"/>
           </a:xfrm>
           <a:prstGeom prst="rect">
             <a:avLst/>
@@ -16911,8 +16811,8 @@
         </p:blipFill>
         <p:spPr>
           <a:xfrm>
-            <a:off x="4719975" y="4186591"/>
-            <a:ext cx="3433426" cy="2145272"/>
+            <a:off x="4267200" y="4058955"/>
+            <a:ext cx="4343401" cy="2713842"/>
           </a:xfrm>
           <a:prstGeom prst="rect">
             <a:avLst/>
@@ -17227,8 +17127,8 @@
         </p:blipFill>
         <p:spPr>
           <a:xfrm>
-            <a:off x="3863534" y="1461821"/>
-            <a:ext cx="2938772" cy="2629184"/>
+            <a:off x="3581400" y="1461821"/>
+            <a:ext cx="3220906" cy="2881596"/>
           </a:xfrm>
           <a:prstGeom prst="rect">
             <a:avLst/>
@@ -17276,8 +17176,8 @@
         </p:blipFill>
         <p:spPr>
           <a:xfrm>
-            <a:off x="5943600" y="3521090"/>
-            <a:ext cx="2938772" cy="2776537"/>
+            <a:off x="5914171" y="3810000"/>
+            <a:ext cx="3128626" cy="2955910"/>
           </a:xfrm>
           <a:prstGeom prst="rect">
             <a:avLst/>
@@ -17573,12 +17473,17 @@
         </p:blipFill>
         <p:spPr>
           <a:xfrm>
-            <a:off x="3834259" y="1469497"/>
-            <a:ext cx="4623941" cy="2938000"/>
+            <a:off x="3882005" y="1474464"/>
+            <a:ext cx="5004941" cy="3180083"/>
           </a:xfrm>
           <a:prstGeom prst="rect">
             <a:avLst/>
           </a:prstGeom>
+          <a:ln>
+            <a:solidFill>
+              <a:srgbClr val="404040"/>
+            </a:solidFill>
+          </a:ln>
         </p:spPr>
         <p:style>
           <a:lnRef idx="2">
@@ -17617,13 +17522,17 @@
         </p:blipFill>
         <p:spPr>
           <a:xfrm>
-            <a:off x="4815110" y="4686574"/>
-            <a:ext cx="2662238" cy="1637339"/>
+            <a:off x="3882005" y="4800600"/>
+            <a:ext cx="3210148" cy="1974317"/>
           </a:xfrm>
           <a:prstGeom prst="rect">
             <a:avLst/>
           </a:prstGeom>
-          <a:ln/>
+          <a:ln>
+            <a:solidFill>
+              <a:srgbClr val="404040"/>
+            </a:solidFill>
+          </a:ln>
         </p:spPr>
         <p:style>
           <a:lnRef idx="2">
@@ -17910,8 +17819,8 @@
         </p:blipFill>
         <p:spPr>
           <a:xfrm>
-            <a:off x="4343400" y="1843796"/>
-            <a:ext cx="4419600" cy="2795954"/>
+            <a:off x="3911103" y="1883688"/>
+            <a:ext cx="4750793" cy="3005475"/>
           </a:xfrm>
           <a:prstGeom prst="rect">
             <a:avLst/>
@@ -17959,8 +17868,8 @@
         </p:blipFill>
         <p:spPr>
           <a:xfrm>
-            <a:off x="5000849" y="4809480"/>
-            <a:ext cx="3099462" cy="1912787"/>
+            <a:off x="3911102" y="5029200"/>
+            <a:ext cx="2839897" cy="1752600"/>
           </a:xfrm>
           <a:prstGeom prst="rect">
             <a:avLst/>
@@ -18364,8 +18273,8 @@
         </p:nvSpPr>
         <p:spPr>
           <a:xfrm>
-            <a:off x="4325223" y="1149066"/>
-            <a:ext cx="3066178" cy="646331"/>
+            <a:off x="4325222" y="1149066"/>
+            <a:ext cx="3447177" cy="707886"/>
           </a:xfrm>
           <a:prstGeom prst="rect">
             <a:avLst/>
@@ -18373,6 +18282,11 @@
           <a:solidFill>
             <a:srgbClr val="404040"/>
           </a:solidFill>
+          <a:ln>
+            <a:solidFill>
+              <a:srgbClr val="404040"/>
+            </a:solidFill>
+          </a:ln>
         </p:spPr>
         <p:style>
           <a:lnRef idx="2">
@@ -18397,7 +18311,7 @@
           <a:lstStyle/>
           <a:p>
             <a:r>
-              <a:rPr lang="en-US" sz="1800" dirty="0">
+              <a:rPr lang="en-US" sz="2000" dirty="0">
                 <a:solidFill>
                   <a:schemeClr val="bg1"/>
                 </a:solidFill>
@@ -18405,7 +18319,7 @@
               <a:t>&gt; </a:t>
             </a:r>
             <a:r>
-              <a:rPr lang="en-US" sz="1800" dirty="0" err="1">
+              <a:rPr lang="en-US" sz="2000" dirty="0" err="1">
                 <a:solidFill>
                   <a:schemeClr val="bg1"/>
                 </a:solidFill>
@@ -18413,7 +18327,7 @@
               <a:t>install.packages</a:t>
             </a:r>
             <a:r>
-              <a:rPr lang="en-US" sz="1800" dirty="0">
+              <a:rPr lang="en-US" sz="2000" dirty="0">
                 <a:solidFill>
                   <a:schemeClr val="bg1"/>
                 </a:solidFill>
@@ -18423,7 +18337,7 @@
           </a:p>
           <a:p>
             <a:r>
-              <a:rPr lang="en-US" sz="1800" dirty="0">
+              <a:rPr lang="en-US" sz="2000" dirty="0">
                 <a:solidFill>
                   <a:schemeClr val="bg1"/>
                 </a:solidFill>
@@ -18448,7 +18362,7 @@
         <p:spPr>
           <a:xfrm>
             <a:off x="7224486" y="3244334"/>
-            <a:ext cx="1614714" cy="369332"/>
+            <a:ext cx="1767114" cy="400110"/>
           </a:xfrm>
           <a:prstGeom prst="rect">
             <a:avLst/>
@@ -18456,6 +18370,11 @@
           <a:solidFill>
             <a:srgbClr val="404040"/>
           </a:solidFill>
+          <a:ln>
+            <a:solidFill>
+              <a:srgbClr val="404040"/>
+            </a:solidFill>
+          </a:ln>
         </p:spPr>
         <p:style>
           <a:lnRef idx="2">
@@ -18480,7 +18399,7 @@
           <a:lstStyle/>
           <a:p>
             <a:r>
-              <a:rPr lang="en-US" sz="1800" dirty="0">
+              <a:rPr lang="en-US" sz="2000" dirty="0">
                 <a:solidFill>
                   <a:schemeClr val="bg1"/>
                 </a:solidFill>
@@ -18504,8 +18423,8 @@
         </p:nvSpPr>
         <p:spPr>
           <a:xfrm>
-            <a:off x="7315200" y="3991001"/>
-            <a:ext cx="1066800" cy="369332"/>
+            <a:off x="7315199" y="3991001"/>
+            <a:ext cx="1168697" cy="400110"/>
           </a:xfrm>
           <a:prstGeom prst="rect">
             <a:avLst/>
@@ -18513,6 +18432,11 @@
           <a:solidFill>
             <a:srgbClr val="404040"/>
           </a:solidFill>
+          <a:ln>
+            <a:solidFill>
+              <a:srgbClr val="404040"/>
+            </a:solidFill>
+          </a:ln>
         </p:spPr>
         <p:style>
           <a:lnRef idx="2">
@@ -18537,7 +18461,7 @@
           <a:lstStyle/>
           <a:p>
             <a:r>
-              <a:rPr lang="en-US" sz="1800" dirty="0">
+              <a:rPr lang="en-US" sz="2000" dirty="0">
                 <a:solidFill>
                   <a:schemeClr val="bg1"/>
                 </a:solidFill>
@@ -18817,8 +18741,8 @@
         </p:blipFill>
         <p:spPr>
           <a:xfrm>
-            <a:off x="3832882" y="1485428"/>
-            <a:ext cx="2561471" cy="3767666"/>
+            <a:off x="3581400" y="1461043"/>
+            <a:ext cx="3634718" cy="5346304"/>
           </a:xfrm>
           <a:prstGeom prst="rect">
             <a:avLst/>
@@ -18866,8 +18790,8 @@
         </p:blipFill>
         <p:spPr>
           <a:xfrm>
-            <a:off x="5928617" y="2428824"/>
-            <a:ext cx="2910584" cy="1839327"/>
+            <a:off x="5859833" y="4134195"/>
+            <a:ext cx="2893926" cy="1828800"/>
           </a:xfrm>
           <a:prstGeom prst="rect">
             <a:avLst/>
@@ -19792,7 +19716,7 @@
         <p:spPr>
           <a:xfrm>
             <a:off x="3810000" y="643467"/>
-            <a:ext cx="5105400" cy="6740307"/>
+            <a:ext cx="5105400" cy="7109639"/>
           </a:xfrm>
           <a:prstGeom prst="rect">
             <a:avLst/>
@@ -19973,6 +19897,14 @@
               </a:rPr>
               <a:t> = date and times</a:t>
             </a:r>
+          </a:p>
+          <a:p>
+            <a:pPr lvl="1"/>
+            <a:endParaRPr lang="en-US" sz="1600" dirty="0">
+              <a:solidFill>
+                <a:srgbClr val="404040"/>
+              </a:solidFill>
+            </a:endParaRPr>
           </a:p>
           <a:p>
             <a:pPr marL="342900" indent="-342900">
@@ -20080,8 +20012,8 @@
         </p:nvSpPr>
         <p:spPr>
           <a:xfrm>
-            <a:off x="6264729" y="701926"/>
-            <a:ext cx="932577" cy="369332"/>
+            <a:off x="6256846" y="643467"/>
+            <a:ext cx="1050471" cy="400110"/>
           </a:xfrm>
           <a:prstGeom prst="rect">
             <a:avLst/>
@@ -20089,6 +20021,11 @@
           <a:solidFill>
             <a:srgbClr val="404040"/>
           </a:solidFill>
+          <a:ln>
+            <a:solidFill>
+              <a:srgbClr val="404040"/>
+            </a:solidFill>
+          </a:ln>
         </p:spPr>
         <p:style>
           <a:lnRef idx="2">
@@ -20113,7 +20050,7 @@
           <a:lstStyle/>
           <a:p>
             <a:r>
-              <a:rPr lang="en-US" sz="1800" dirty="0">
+              <a:rPr lang="en-US" sz="2000" dirty="0">
                 <a:solidFill>
                   <a:schemeClr val="bg1"/>
                 </a:solidFill>
@@ -21236,8 +21173,8 @@
         </p:blipFill>
         <p:spPr>
           <a:xfrm>
-            <a:off x="4191000" y="3343539"/>
-            <a:ext cx="4740483" cy="2447661"/>
+            <a:off x="3581400" y="3339335"/>
+            <a:ext cx="5478381" cy="2828661"/>
           </a:xfrm>
           <a:prstGeom prst="rect">
             <a:avLst/>
@@ -21469,7 +21406,7 @@
         <p:spPr>
           <a:xfrm>
             <a:off x="3733800" y="643467"/>
-            <a:ext cx="5257800" cy="4154984"/>
+            <a:ext cx="5257800" cy="4524315"/>
           </a:xfrm>
           <a:prstGeom prst="rect">
             <a:avLst/>
@@ -21494,6 +21431,17 @@
               </a:rPr>
               <a:t>Numerical Precision</a:t>
             </a:r>
+          </a:p>
+          <a:p>
+            <a:pPr marL="800100" lvl="1" indent="-342900">
+              <a:buFont typeface="Arial" panose="020B0604020202020204" pitchFamily="34" charset="0"/>
+              <a:buChar char="•"/>
+            </a:pPr>
+            <a:endParaRPr lang="en-US" dirty="0">
+              <a:solidFill>
+                <a:srgbClr val="404040"/>
+              </a:solidFill>
+            </a:endParaRPr>
           </a:p>
           <a:p>
             <a:pPr marL="800100" lvl="1" indent="-342900">
@@ -21626,7 +21574,7 @@
         </p:blipFill>
         <p:spPr>
           <a:xfrm>
-            <a:off x="4648200" y="1600200"/>
+            <a:off x="4648200" y="1856457"/>
             <a:ext cx="2152650" cy="1724025"/>
           </a:xfrm>
           <a:prstGeom prst="rect">
@@ -21675,7 +21623,7 @@
         </p:blipFill>
         <p:spPr>
           <a:xfrm>
-            <a:off x="4648200" y="4191918"/>
+            <a:off x="4648200" y="4448175"/>
             <a:ext cx="3629025" cy="1114425"/>
           </a:xfrm>
           <a:prstGeom prst="rect">

</xml_diff>